<commit_message>
Dorađena Angular 2 prezentacija, dodani naslovni slajdovi na prezentacije
</commit_message>
<xml_diff>
--- a/prezentacije/1-3 Alati u razvoju.pptx
+++ b/prezentacije/1-3 Alati u razvoju.pptx
@@ -5,28 +5,29 @@
     <p:sldMasterId id="2147483648" r:id="rId1"/>
   </p:sldMasterIdLst>
   <p:notesMasterIdLst>
-    <p:notesMasterId r:id="rId21"/>
+    <p:notesMasterId r:id="rId22"/>
   </p:notesMasterIdLst>
   <p:sldIdLst>
-    <p:sldId id="258" r:id="rId2"/>
-    <p:sldId id="259" r:id="rId3"/>
-    <p:sldId id="260" r:id="rId4"/>
-    <p:sldId id="261" r:id="rId5"/>
-    <p:sldId id="272" r:id="rId6"/>
-    <p:sldId id="263" r:id="rId7"/>
-    <p:sldId id="275" r:id="rId8"/>
-    <p:sldId id="276" r:id="rId9"/>
-    <p:sldId id="278" r:id="rId10"/>
-    <p:sldId id="277" r:id="rId11"/>
-    <p:sldId id="265" r:id="rId12"/>
-    <p:sldId id="266" r:id="rId13"/>
-    <p:sldId id="267" r:id="rId14"/>
-    <p:sldId id="270" r:id="rId15"/>
-    <p:sldId id="271" r:id="rId16"/>
-    <p:sldId id="274" r:id="rId17"/>
-    <p:sldId id="262" r:id="rId18"/>
-    <p:sldId id="257" r:id="rId19"/>
-    <p:sldId id="279" r:id="rId20"/>
+    <p:sldId id="281" r:id="rId2"/>
+    <p:sldId id="258" r:id="rId3"/>
+    <p:sldId id="259" r:id="rId4"/>
+    <p:sldId id="260" r:id="rId5"/>
+    <p:sldId id="261" r:id="rId6"/>
+    <p:sldId id="272" r:id="rId7"/>
+    <p:sldId id="263" r:id="rId8"/>
+    <p:sldId id="275" r:id="rId9"/>
+    <p:sldId id="276" r:id="rId10"/>
+    <p:sldId id="278" r:id="rId11"/>
+    <p:sldId id="277" r:id="rId12"/>
+    <p:sldId id="265" r:id="rId13"/>
+    <p:sldId id="266" r:id="rId14"/>
+    <p:sldId id="267" r:id="rId15"/>
+    <p:sldId id="270" r:id="rId16"/>
+    <p:sldId id="271" r:id="rId17"/>
+    <p:sldId id="274" r:id="rId18"/>
+    <p:sldId id="262" r:id="rId19"/>
+    <p:sldId id="257" r:id="rId20"/>
+    <p:sldId id="279" r:id="rId21"/>
   </p:sldIdLst>
   <p:sldSz cx="12192000" cy="6858000"/>
   <p:notesSz cx="6858000" cy="9144000"/>
@@ -215,7 +216,7 @@
           <a:p>
             <a:fld id="{3EC99C4B-131F-44C7-9192-173D28B840E6}" type="datetimeFigureOut">
               <a:rPr lang="hr-HR" smtClean="0"/>
-              <a:t>1.5.2017.</a:t>
+              <a:t>2.5.2017.</a:t>
             </a:fld>
             <a:endParaRPr lang="hr-HR"/>
           </a:p>
@@ -564,7 +565,7 @@
           <a:p>
             <a:fld id="{63BB50E0-CD38-4D20-957B-0AC75134BF07}" type="slidenum">
               <a:rPr lang="hr-HR" smtClean="0"/>
-              <a:t>1</a:t>
+              <a:t>2</a:t>
             </a:fld>
             <a:endParaRPr lang="hr-HR"/>
           </a:p>
@@ -656,7 +657,7 @@
           <a:p>
             <a:fld id="{63BB50E0-CD38-4D20-957B-0AC75134BF07}" type="slidenum">
               <a:rPr lang="hr-HR" smtClean="0"/>
-              <a:t>6</a:t>
+              <a:t>7</a:t>
             </a:fld>
             <a:endParaRPr lang="hr-HR"/>
           </a:p>
@@ -748,7 +749,7 @@
           <a:p>
             <a:fld id="{63BB50E0-CD38-4D20-957B-0AC75134BF07}" type="slidenum">
               <a:rPr lang="hr-HR" smtClean="0"/>
-              <a:t>7</a:t>
+              <a:t>8</a:t>
             </a:fld>
             <a:endParaRPr lang="hr-HR"/>
           </a:p>
@@ -840,7 +841,7 @@
           <a:p>
             <a:fld id="{63BB50E0-CD38-4D20-957B-0AC75134BF07}" type="slidenum">
               <a:rPr lang="hr-HR" smtClean="0"/>
-              <a:t>8</a:t>
+              <a:t>9</a:t>
             </a:fld>
             <a:endParaRPr lang="hr-HR"/>
           </a:p>
@@ -932,7 +933,7 @@
           <a:p>
             <a:fld id="{63BB50E0-CD38-4D20-957B-0AC75134BF07}" type="slidenum">
               <a:rPr lang="hr-HR" smtClean="0"/>
-              <a:t>10</a:t>
+              <a:t>11</a:t>
             </a:fld>
             <a:endParaRPr lang="hr-HR"/>
           </a:p>
@@ -1050,7 +1051,7 @@
           <a:p>
             <a:fld id="{3B95FDCD-520A-40CC-98D9-F64FA784BBEB}" type="slidenum">
               <a:rPr lang="hr-HR" smtClean="0"/>
-              <a:t>14</a:t>
+              <a:t>15</a:t>
             </a:fld>
             <a:endParaRPr lang="hr-HR"/>
           </a:p>
@@ -1134,7 +1135,7 @@
           <a:p>
             <a:fld id="{63BB50E0-CD38-4D20-957B-0AC75134BF07}" type="slidenum">
               <a:rPr lang="hr-HR" smtClean="0"/>
-              <a:t>16</a:t>
+              <a:t>17</a:t>
             </a:fld>
             <a:endParaRPr lang="hr-HR"/>
           </a:p>
@@ -1284,7 +1285,7 @@
           <a:p>
             <a:fld id="{E96F6D18-14D9-4839-AD4E-F9C57A5B3B13}" type="datetimeFigureOut">
               <a:rPr lang="hr-HR" smtClean="0"/>
-              <a:t>1.5.2017.</a:t>
+              <a:t>2.5.2017.</a:t>
             </a:fld>
             <a:endParaRPr lang="hr-HR"/>
           </a:p>
@@ -1454,7 +1455,7 @@
           <a:p>
             <a:fld id="{E96F6D18-14D9-4839-AD4E-F9C57A5B3B13}" type="datetimeFigureOut">
               <a:rPr lang="hr-HR" smtClean="0"/>
-              <a:t>1.5.2017.</a:t>
+              <a:t>2.5.2017.</a:t>
             </a:fld>
             <a:endParaRPr lang="hr-HR"/>
           </a:p>
@@ -1634,7 +1635,7 @@
           <a:p>
             <a:fld id="{E96F6D18-14D9-4839-AD4E-F9C57A5B3B13}" type="datetimeFigureOut">
               <a:rPr lang="hr-HR" smtClean="0"/>
-              <a:t>1.5.2017.</a:t>
+              <a:t>2.5.2017.</a:t>
             </a:fld>
             <a:endParaRPr lang="hr-HR"/>
           </a:p>
@@ -1804,7 +1805,7 @@
           <a:p>
             <a:fld id="{E96F6D18-14D9-4839-AD4E-F9C57A5B3B13}" type="datetimeFigureOut">
               <a:rPr lang="hr-HR" smtClean="0"/>
-              <a:t>1.5.2017.</a:t>
+              <a:t>2.5.2017.</a:t>
             </a:fld>
             <a:endParaRPr lang="hr-HR"/>
           </a:p>
@@ -2050,7 +2051,7 @@
           <a:p>
             <a:fld id="{E96F6D18-14D9-4839-AD4E-F9C57A5B3B13}" type="datetimeFigureOut">
               <a:rPr lang="hr-HR" smtClean="0"/>
-              <a:t>1.5.2017.</a:t>
+              <a:t>2.5.2017.</a:t>
             </a:fld>
             <a:endParaRPr lang="hr-HR"/>
           </a:p>
@@ -2282,7 +2283,7 @@
           <a:p>
             <a:fld id="{E96F6D18-14D9-4839-AD4E-F9C57A5B3B13}" type="datetimeFigureOut">
               <a:rPr lang="hr-HR" smtClean="0"/>
-              <a:t>1.5.2017.</a:t>
+              <a:t>2.5.2017.</a:t>
             </a:fld>
             <a:endParaRPr lang="hr-HR"/>
           </a:p>
@@ -2649,7 +2650,7 @@
           <a:p>
             <a:fld id="{E96F6D18-14D9-4839-AD4E-F9C57A5B3B13}" type="datetimeFigureOut">
               <a:rPr lang="hr-HR" smtClean="0"/>
-              <a:t>1.5.2017.</a:t>
+              <a:t>2.5.2017.</a:t>
             </a:fld>
             <a:endParaRPr lang="hr-HR"/>
           </a:p>
@@ -2767,7 +2768,7 @@
           <a:p>
             <a:fld id="{E96F6D18-14D9-4839-AD4E-F9C57A5B3B13}" type="datetimeFigureOut">
               <a:rPr lang="hr-HR" smtClean="0"/>
-              <a:t>1.5.2017.</a:t>
+              <a:t>2.5.2017.</a:t>
             </a:fld>
             <a:endParaRPr lang="hr-HR"/>
           </a:p>
@@ -2862,7 +2863,7 @@
           <a:p>
             <a:fld id="{E96F6D18-14D9-4839-AD4E-F9C57A5B3B13}" type="datetimeFigureOut">
               <a:rPr lang="hr-HR" smtClean="0"/>
-              <a:t>1.5.2017.</a:t>
+              <a:t>2.5.2017.</a:t>
             </a:fld>
             <a:endParaRPr lang="hr-HR"/>
           </a:p>
@@ -3139,7 +3140,7 @@
           <a:p>
             <a:fld id="{E96F6D18-14D9-4839-AD4E-F9C57A5B3B13}" type="datetimeFigureOut">
               <a:rPr lang="hr-HR" smtClean="0"/>
-              <a:t>1.5.2017.</a:t>
+              <a:t>2.5.2017.</a:t>
             </a:fld>
             <a:endParaRPr lang="hr-HR"/>
           </a:p>
@@ -3392,7 +3393,7 @@
           <a:p>
             <a:fld id="{E96F6D18-14D9-4839-AD4E-F9C57A5B3B13}" type="datetimeFigureOut">
               <a:rPr lang="hr-HR" smtClean="0"/>
-              <a:t>1.5.2017.</a:t>
+              <a:t>2.5.2017.</a:t>
             </a:fld>
             <a:endParaRPr lang="hr-HR"/>
           </a:p>
@@ -3605,7 +3606,7 @@
           <a:p>
             <a:fld id="{E96F6D18-14D9-4839-AD4E-F9C57A5B3B13}" type="datetimeFigureOut">
               <a:rPr lang="hr-HR" smtClean="0"/>
-              <a:t>1.5.2017.</a:t>
+              <a:t>2.5.2017.</a:t>
             </a:fld>
             <a:endParaRPr lang="hr-HR"/>
           </a:p>
@@ -4010,6 +4011,29 @@
           <a:chExt cx="0" cy="0"/>
         </a:xfrm>
       </p:grpSpPr>
+      <p:pic>
+        <p:nvPicPr>
+          <p:cNvPr id="7" name="Picture 6"/>
+          <p:cNvPicPr>
+            <a:picLocks noChangeAspect="1"/>
+          </p:cNvPicPr>
+          <p:nvPr/>
+        </p:nvPicPr>
+        <p:blipFill rotWithShape="1">
+          <a:blip r:embed="rId2"/>
+          <a:srcRect l="27535" t="4176" r="27697" b="2733"/>
+          <a:stretch/>
+        </p:blipFill>
+        <p:spPr>
+          <a:xfrm>
+            <a:off x="3158836" y="2616273"/>
+            <a:ext cx="1625696" cy="1690255"/>
+          </a:xfrm>
+          <a:prstGeom prst="rect">
+            <a:avLst/>
+          </a:prstGeom>
+        </p:spPr>
+      </p:pic>
       <p:sp>
         <p:nvSpPr>
           <p:cNvPr id="2" name="Title 1"/>
@@ -4017,25 +4041,22 @@
             <a:spLocks noGrp="1"/>
           </p:cNvSpPr>
           <p:nvPr>
-            <p:ph type="title"/>
-          </p:nvPr>
-        </p:nvSpPr>
-        <p:spPr/>
+            <p:ph type="ctrTitle"/>
+          </p:nvPr>
+        </p:nvSpPr>
+        <p:spPr>
+          <a:xfrm>
+            <a:off x="1524000" y="171595"/>
+            <a:ext cx="9144000" cy="2387600"/>
+          </a:xfrm>
+        </p:spPr>
         <p:txBody>
           <a:bodyPr/>
           <a:lstStyle/>
           <a:p>
             <a:r>
-              <a:rPr lang="hr-HR" dirty="0" err="1"/>
-              <a:t>Visual</a:t>
-            </a:r>
-            <a:r>
-              <a:rPr lang="hr-HR" dirty="0"/>
-              <a:t> </a:t>
-            </a:r>
-            <a:r>
-              <a:rPr lang="hr-HR" dirty="0" smtClean="0"/>
-              <a:t>Studio</a:t>
+              <a:rPr lang="hr-HR" dirty="0" smtClean="0"/>
+              <a:t>1-3 ALATI U RAZVOJU</a:t>
             </a:r>
             <a:endParaRPr lang="hr-HR" dirty="0"/>
           </a:p>
@@ -4043,120 +4064,137 @@
       </p:sp>
       <p:sp>
         <p:nvSpPr>
-          <p:cNvPr id="3" name="Content Placeholder 2"/>
-          <p:cNvSpPr>
-            <a:spLocks noGrp="1"/>
-          </p:cNvSpPr>
-          <p:nvPr>
-            <p:ph idx="1"/>
+          <p:cNvPr id="3" name="Subtitle 2"/>
+          <p:cNvSpPr>
+            <a:spLocks noGrp="1"/>
+          </p:cNvSpPr>
+          <p:nvPr>
+            <p:ph type="subTitle" idx="1"/>
           </p:nvPr>
         </p:nvSpPr>
         <p:spPr>
           <a:xfrm>
-            <a:off x="5205844" y="1825625"/>
-            <a:ext cx="6147955" cy="4351338"/>
+            <a:off x="1524000" y="4802765"/>
+            <a:ext cx="9144000" cy="1655762"/>
           </a:xfrm>
         </p:spPr>
         <p:txBody>
+          <a:bodyPr>
+            <a:normAutofit lnSpcReduction="10000"/>
+          </a:bodyPr>
+          <a:lstStyle/>
+          <a:p>
+            <a:r>
+              <a:rPr lang="hr-HR" dirty="0" smtClean="0"/>
+              <a:t>Maro Marčinko</a:t>
+            </a:r>
+          </a:p>
+          <a:p>
+            <a:r>
+              <a:rPr lang="hr-HR" dirty="0" smtClean="0"/>
+              <a:t>Matija Hrženjak</a:t>
+            </a:r>
+          </a:p>
+          <a:p>
+            <a:endParaRPr lang="hr-HR" dirty="0"/>
+          </a:p>
+          <a:p>
+            <a:r>
+              <a:rPr lang="hr-HR" dirty="0" smtClean="0"/>
+              <a:t>IN2, 2017.</a:t>
+            </a:r>
+            <a:endParaRPr lang="hr-HR" dirty="0"/>
+          </a:p>
+        </p:txBody>
+      </p:sp>
+      <p:pic>
+        <p:nvPicPr>
+          <p:cNvPr id="8" name="Picture 7"/>
+          <p:cNvPicPr>
+            <a:picLocks noChangeAspect="1"/>
+          </p:cNvPicPr>
+          <p:nvPr/>
+        </p:nvPicPr>
+        <p:blipFill rotWithShape="1">
+          <a:blip r:embed="rId3"/>
+          <a:srcRect t="37740" b="36771"/>
+          <a:stretch/>
+        </p:blipFill>
+        <p:spPr>
+          <a:xfrm>
+            <a:off x="5418556" y="2950876"/>
+            <a:ext cx="4005820" cy="1021050"/>
+          </a:xfrm>
+          <a:prstGeom prst="rect">
+            <a:avLst/>
+          </a:prstGeom>
+        </p:spPr>
+      </p:pic>
+    </p:spTree>
+    <p:extLst>
+      <p:ext uri="{BB962C8B-B14F-4D97-AF65-F5344CB8AC3E}">
+        <p14:creationId xmlns:p14="http://schemas.microsoft.com/office/powerpoint/2010/main" val="903344590"/>
+      </p:ext>
+    </p:extLst>
+  </p:cSld>
+  <p:clrMapOvr>
+    <a:masterClrMapping/>
+  </p:clrMapOvr>
+</p:sld>
+</file>
+
+<file path=ppt/slides/slide10.xml><?xml version="1.0" encoding="utf-8"?>
+<p:sld xmlns:a="http://schemas.openxmlformats.org/drawingml/2006/main" xmlns:r="http://schemas.openxmlformats.org/officeDocument/2006/relationships" xmlns:p="http://schemas.openxmlformats.org/presentationml/2006/main">
+  <p:cSld>
+    <p:spTree>
+      <p:nvGrpSpPr>
+        <p:cNvPr id="1" name=""/>
+        <p:cNvGrpSpPr/>
+        <p:nvPr/>
+      </p:nvGrpSpPr>
+      <p:grpSpPr>
+        <a:xfrm>
+          <a:off x="0" y="0"/>
+          <a:ext cx="0" cy="0"/>
+          <a:chOff x="0" y="0"/>
+          <a:chExt cx="0" cy="0"/>
+        </a:xfrm>
+      </p:grpSpPr>
+      <p:sp>
+        <p:nvSpPr>
+          <p:cNvPr id="2" name="Title 1"/>
+          <p:cNvSpPr>
+            <a:spLocks noGrp="1"/>
+          </p:cNvSpPr>
+          <p:nvPr>
+            <p:ph type="title"/>
+          </p:nvPr>
+        </p:nvSpPr>
+        <p:spPr/>
+        <p:txBody>
           <a:bodyPr/>
           <a:lstStyle/>
           <a:p>
-            <a:r>
-              <a:rPr lang="hr-HR" dirty="0" err="1" smtClean="0"/>
-              <a:t>Visual</a:t>
-            </a:r>
-            <a:r>
-              <a:rPr lang="hr-HR" dirty="0" smtClean="0"/>
-              <a:t> Studio 97 (v5.0 – v6.0)</a:t>
-            </a:r>
-          </a:p>
-          <a:p>
-            <a:pPr lvl="1"/>
-            <a:r>
-              <a:rPr lang="hr-HR" dirty="0" smtClean="0"/>
-              <a:t>J++, InterDev, C++, </a:t>
-            </a:r>
-            <a:r>
-              <a:rPr lang="hr-HR" dirty="0" err="1" smtClean="0"/>
-              <a:t>Basic</a:t>
-            </a:r>
-            <a:r>
-              <a:rPr lang="hr-HR" dirty="0" smtClean="0"/>
-              <a:t>, FoxPro</a:t>
-            </a:r>
-          </a:p>
-          <a:p>
-            <a:r>
-              <a:rPr lang="hr-HR" dirty="0" err="1" smtClean="0"/>
-              <a:t>Visual</a:t>
-            </a:r>
-            <a:r>
-              <a:rPr lang="hr-HR" dirty="0" smtClean="0"/>
-              <a:t> Studio .NET (2002)</a:t>
-            </a:r>
-          </a:p>
-          <a:p>
-            <a:pPr lvl="1"/>
-            <a:r>
-              <a:rPr lang="hr-HR" dirty="0" smtClean="0"/>
-              <a:t>.NET Framework 1.0</a:t>
-            </a:r>
-          </a:p>
-          <a:p>
-            <a:pPr lvl="1"/>
-            <a:r>
-              <a:rPr lang="hr-HR" dirty="0" err="1" smtClean="0"/>
-              <a:t>Basic</a:t>
-            </a:r>
-            <a:r>
-              <a:rPr lang="hr-HR" dirty="0" smtClean="0"/>
-              <a:t> .NET, C#</a:t>
-            </a:r>
-          </a:p>
-          <a:p>
-            <a:r>
-              <a:rPr lang="hr-HR" dirty="0" err="1" smtClean="0"/>
-              <a:t>Visual</a:t>
-            </a:r>
-            <a:r>
-              <a:rPr lang="hr-HR" dirty="0" smtClean="0"/>
-              <a:t> Studio 2005</a:t>
-            </a:r>
-          </a:p>
-          <a:p>
-            <a:pPr lvl="1"/>
-            <a:r>
-              <a:rPr lang="hr-HR" dirty="0" smtClean="0"/>
-              <a:t>.NET Framework 2.0/3.0</a:t>
-            </a:r>
-          </a:p>
-          <a:p>
-            <a:pPr lvl="1"/>
-            <a:r>
-              <a:rPr lang="hr-HR" dirty="0" smtClean="0"/>
-              <a:t>64-bit </a:t>
-            </a:r>
-            <a:r>
-              <a:rPr lang="hr-HR" dirty="0" err="1" smtClean="0"/>
-              <a:t>support</a:t>
-            </a:r>
-            <a:endParaRPr lang="hr-HR" dirty="0" smtClean="0"/>
-          </a:p>
-          <a:p>
-            <a:pPr lvl="1"/>
-            <a:r>
-              <a:rPr lang="hr-HR" dirty="0" smtClean="0"/>
-              <a:t>Automatski </a:t>
-            </a:r>
-            <a:r>
-              <a:rPr lang="hr-HR" dirty="0" err="1" smtClean="0"/>
-              <a:t>IntelliSense</a:t>
-            </a:r>
-            <a:endParaRPr lang="hr-HR" dirty="0" smtClean="0"/>
-          </a:p>
-          <a:p>
-            <a:pPr lvl="1"/>
-            <a:endParaRPr lang="hr-HR" dirty="0" smtClean="0"/>
+            <a:endParaRPr lang="hr-HR"/>
+          </a:p>
+        </p:txBody>
+      </p:sp>
+      <p:sp>
+        <p:nvSpPr>
+          <p:cNvPr id="3" name="Content Placeholder 2"/>
+          <p:cNvSpPr>
+            <a:spLocks noGrp="1"/>
+          </p:cNvSpPr>
+          <p:nvPr>
+            <p:ph idx="1"/>
+          </p:nvPr>
+        </p:nvSpPr>
+        <p:spPr/>
+        <p:txBody>
+          <a:bodyPr/>
+          <a:lstStyle/>
+          <a:p>
+            <a:endParaRPr lang="hr-HR"/>
           </a:p>
         </p:txBody>
       </p:sp>
@@ -4169,7 +4207,7 @@
           <p:nvPr/>
         </p:nvPicPr>
         <p:blipFill>
-          <a:blip r:embed="rId3">
+          <a:blip r:embed="rId2">
             <a:extLst>
               <a:ext uri="{28A0092B-C50C-407E-A947-70E740481C1C}">
                 <a14:useLocalDpi xmlns:a14="http://schemas.microsoft.com/office/drawing/2010/main" val="0"/>
@@ -4182,8 +4220,8 @@
         </p:blipFill>
         <p:spPr>
           <a:xfrm>
-            <a:off x="942109" y="1620044"/>
-            <a:ext cx="3867150" cy="4762500"/>
+            <a:off x="555913" y="450314"/>
+            <a:ext cx="11009169" cy="5726649"/>
           </a:xfrm>
           <a:prstGeom prst="rect">
             <a:avLst/>
@@ -4193,24 +4231,17 @@
     </p:spTree>
     <p:extLst>
       <p:ext uri="{BB962C8B-B14F-4D97-AF65-F5344CB8AC3E}">
-        <p14:creationId xmlns:p14="http://schemas.microsoft.com/office/powerpoint/2010/main" val="1191203112"/>
+        <p14:creationId xmlns:p14="http://schemas.microsoft.com/office/powerpoint/2010/main" val="257498850"/>
       </p:ext>
     </p:extLst>
   </p:cSld>
   <p:clrMapOvr>
     <a:masterClrMapping/>
   </p:clrMapOvr>
-  <p:timing>
-    <p:tnLst>
-      <p:par>
-        <p:cTn id="1" dur="indefinite" restart="never" nodeType="tmRoot"/>
-      </p:par>
-    </p:tnLst>
-  </p:timing>
 </p:sld>
 </file>
 
-<file path=ppt/slides/slide10.xml><?xml version="1.0" encoding="utf-8"?>
+<file path=ppt/slides/slide11.xml><?xml version="1.0" encoding="utf-8"?>
 <p:sld xmlns:a="http://schemas.openxmlformats.org/drawingml/2006/main" xmlns:r="http://schemas.openxmlformats.org/officeDocument/2006/relationships" xmlns:p="http://schemas.openxmlformats.org/presentationml/2006/main">
   <p:cSld>
     <p:spTree>
@@ -4338,7 +4369,7 @@
 </p:sld>
 </file>
 
-<file path=ppt/slides/slide11.xml><?xml version="1.0" encoding="utf-8"?>
+<file path=ppt/slides/slide12.xml><?xml version="1.0" encoding="utf-8"?>
 <p:sld xmlns:a="http://schemas.openxmlformats.org/drawingml/2006/main" xmlns:r="http://schemas.openxmlformats.org/officeDocument/2006/relationships" xmlns:p="http://schemas.openxmlformats.org/presentationml/2006/main">
   <p:cSld>
     <p:spTree>
@@ -4520,228 +4551,6 @@
 </p:sld>
 </file>
 
-<file path=ppt/slides/slide12.xml><?xml version="1.0" encoding="utf-8"?>
-<p:sld xmlns:a="http://schemas.openxmlformats.org/drawingml/2006/main" xmlns:r="http://schemas.openxmlformats.org/officeDocument/2006/relationships" xmlns:p="http://schemas.openxmlformats.org/presentationml/2006/main">
-  <p:cSld>
-    <p:spTree>
-      <p:nvGrpSpPr>
-        <p:cNvPr id="1" name=""/>
-        <p:cNvGrpSpPr/>
-        <p:nvPr/>
-      </p:nvGrpSpPr>
-      <p:grpSpPr>
-        <a:xfrm>
-          <a:off x="0" y="0"/>
-          <a:ext cx="0" cy="0"/>
-          <a:chOff x="0" y="0"/>
-          <a:chExt cx="0" cy="0"/>
-        </a:xfrm>
-      </p:grpSpPr>
-      <p:sp>
-        <p:nvSpPr>
-          <p:cNvPr id="2" name="Title 1"/>
-          <p:cNvSpPr>
-            <a:spLocks noGrp="1"/>
-          </p:cNvSpPr>
-          <p:nvPr>
-            <p:ph type="title"/>
-          </p:nvPr>
-        </p:nvSpPr>
-        <p:spPr/>
-        <p:txBody>
-          <a:bodyPr/>
-          <a:lstStyle/>
-          <a:p>
-            <a:r>
-              <a:rPr lang="hr-HR" dirty="0" err="1" smtClean="0"/>
-              <a:t>Visual</a:t>
-            </a:r>
-            <a:r>
-              <a:rPr lang="hr-HR" dirty="0" smtClean="0"/>
-              <a:t> Studio</a:t>
-            </a:r>
-            <a:endParaRPr lang="hr-HR" dirty="0"/>
-          </a:p>
-        </p:txBody>
-      </p:sp>
-      <p:sp>
-        <p:nvSpPr>
-          <p:cNvPr id="3" name="Content Placeholder 2"/>
-          <p:cNvSpPr>
-            <a:spLocks noGrp="1"/>
-          </p:cNvSpPr>
-          <p:nvPr>
-            <p:ph idx="1"/>
-          </p:nvPr>
-        </p:nvSpPr>
-        <p:spPr/>
-        <p:txBody>
-          <a:bodyPr/>
-          <a:lstStyle/>
-          <a:p>
-            <a:r>
-              <a:rPr lang="hr-HR" dirty="0" err="1" smtClean="0"/>
-              <a:t>Compile</a:t>
-            </a:r>
-            <a:r>
-              <a:rPr lang="hr-HR" dirty="0" smtClean="0"/>
-              <a:t> </a:t>
-            </a:r>
-            <a:r>
-              <a:rPr lang="hr-HR" dirty="0" err="1" smtClean="0"/>
-              <a:t>and</a:t>
-            </a:r>
-            <a:r>
-              <a:rPr lang="hr-HR" dirty="0" smtClean="0"/>
-              <a:t> </a:t>
-            </a:r>
-            <a:r>
-              <a:rPr lang="hr-HR" dirty="0" err="1" smtClean="0"/>
-              <a:t>debug</a:t>
-            </a:r>
-            <a:endParaRPr lang="hr-HR" dirty="0" smtClean="0"/>
-          </a:p>
-          <a:p>
-            <a:pPr lvl="1"/>
-            <a:r>
-              <a:rPr lang="hr-HR" dirty="0" err="1" smtClean="0"/>
-              <a:t>Kompajliranje</a:t>
-            </a:r>
-            <a:r>
-              <a:rPr lang="hr-HR" dirty="0" smtClean="0"/>
-              <a:t> i </a:t>
-            </a:r>
-            <a:r>
-              <a:rPr lang="hr-HR" dirty="0" err="1" smtClean="0"/>
-              <a:t>debugiranje</a:t>
-            </a:r>
-            <a:r>
-              <a:rPr lang="hr-HR" dirty="0" smtClean="0"/>
-              <a:t> na jedan klik</a:t>
-            </a:r>
-          </a:p>
-          <a:p>
-            <a:pPr lvl="1"/>
-            <a:r>
-              <a:rPr lang="hr-HR" dirty="0" smtClean="0"/>
-              <a:t>Mogućnost kreiranja </a:t>
-            </a:r>
-            <a:r>
-              <a:rPr lang="hr-HR" dirty="0" err="1" smtClean="0"/>
-              <a:t>Memory</a:t>
-            </a:r>
-            <a:r>
-              <a:rPr lang="hr-HR" dirty="0" smtClean="0"/>
-              <a:t> </a:t>
-            </a:r>
-            <a:r>
-              <a:rPr lang="hr-HR" dirty="0" err="1" smtClean="0"/>
-              <a:t>dumpa</a:t>
-            </a:r>
-            <a:endParaRPr lang="hr-HR" dirty="0" smtClean="0"/>
-          </a:p>
-          <a:p>
-            <a:pPr lvl="1"/>
-            <a:r>
-              <a:rPr lang="hr-HR" dirty="0" err="1" smtClean="0"/>
-              <a:t>Conditional</a:t>
-            </a:r>
-            <a:r>
-              <a:rPr lang="hr-HR" dirty="0" smtClean="0"/>
-              <a:t> </a:t>
-            </a:r>
-            <a:r>
-              <a:rPr lang="hr-HR" dirty="0" err="1" smtClean="0"/>
-              <a:t>breakpoints</a:t>
-            </a:r>
-            <a:r>
-              <a:rPr lang="hr-HR" dirty="0" smtClean="0"/>
-              <a:t>, </a:t>
-            </a:r>
-            <a:r>
-              <a:rPr lang="hr-HR" dirty="0" err="1" smtClean="0"/>
-              <a:t>watches</a:t>
-            </a:r>
-            <a:r>
-              <a:rPr lang="hr-HR" dirty="0" smtClean="0"/>
-              <a:t>, </a:t>
-            </a:r>
-            <a:r>
-              <a:rPr lang="hr-HR" dirty="0" err="1" smtClean="0"/>
-              <a:t>immediate</a:t>
-            </a:r>
-            <a:r>
-              <a:rPr lang="hr-HR" dirty="0" smtClean="0"/>
-              <a:t> window</a:t>
-            </a:r>
-          </a:p>
-          <a:p>
-            <a:r>
-              <a:rPr lang="hr-HR" dirty="0" err="1" smtClean="0"/>
-              <a:t>Performance</a:t>
-            </a:r>
-            <a:r>
-              <a:rPr lang="hr-HR" dirty="0" smtClean="0"/>
-              <a:t> </a:t>
-            </a:r>
-            <a:r>
-              <a:rPr lang="hr-HR" dirty="0" err="1" smtClean="0"/>
-              <a:t>and</a:t>
-            </a:r>
-            <a:r>
-              <a:rPr lang="hr-HR" dirty="0" smtClean="0"/>
-              <a:t> </a:t>
-            </a:r>
-            <a:r>
-              <a:rPr lang="hr-HR" dirty="0" err="1" smtClean="0"/>
-              <a:t>Diagnostics</a:t>
-            </a:r>
-            <a:r>
-              <a:rPr lang="hr-HR" dirty="0" smtClean="0"/>
-              <a:t> (</a:t>
-            </a:r>
-            <a:r>
-              <a:rPr lang="hr-HR" dirty="0" err="1" smtClean="0"/>
-              <a:t>profilers</a:t>
-            </a:r>
-            <a:r>
-              <a:rPr lang="hr-HR" dirty="0" smtClean="0"/>
-              <a:t>)</a:t>
-            </a:r>
-          </a:p>
-          <a:p>
-            <a:pPr lvl="1"/>
-            <a:r>
-              <a:rPr lang="hr-HR" dirty="0" smtClean="0"/>
-              <a:t>Prate rad CPU-a, korištenje memorije i druge podatke o radu aplikacije</a:t>
-            </a:r>
-            <a:endParaRPr lang="hr-HR" dirty="0" smtClean="0"/>
-          </a:p>
-          <a:p>
-            <a:pPr marL="457200" lvl="1" indent="0">
-              <a:buNone/>
-            </a:pPr>
-            <a:endParaRPr lang="hr-HR" dirty="0" smtClean="0"/>
-          </a:p>
-          <a:p>
-            <a:pPr lvl="1"/>
-            <a:endParaRPr lang="hr-HR" dirty="0"/>
-          </a:p>
-        </p:txBody>
-      </p:sp>
-    </p:spTree>
-    <p:extLst>
-      <p:ext uri="{BB962C8B-B14F-4D97-AF65-F5344CB8AC3E}">
-        <p14:creationId xmlns:p14="http://schemas.microsoft.com/office/powerpoint/2010/main" val="477603348"/>
-      </p:ext>
-    </p:extLst>
-  </p:cSld>
-  <p:clrMapOvr>
-    <a:masterClrMapping/>
-  </p:clrMapOvr>
-</p:sld>
-</file>
-
 <file path=ppt/slides/slide13.xml><?xml version="1.0" encoding="utf-8"?>
 <p:sld xmlns:a="http://schemas.openxmlformats.org/drawingml/2006/main" xmlns:r="http://schemas.openxmlformats.org/officeDocument/2006/relationships" xmlns:p="http://schemas.openxmlformats.org/presentationml/2006/main">
   <p:cSld>
@@ -4796,6 +4605,227 @@
             <p:ph idx="1"/>
           </p:nvPr>
         </p:nvSpPr>
+        <p:spPr/>
+        <p:txBody>
+          <a:bodyPr/>
+          <a:lstStyle/>
+          <a:p>
+            <a:r>
+              <a:rPr lang="hr-HR" dirty="0" err="1" smtClean="0"/>
+              <a:t>Compile</a:t>
+            </a:r>
+            <a:r>
+              <a:rPr lang="hr-HR" dirty="0" smtClean="0"/>
+              <a:t> </a:t>
+            </a:r>
+            <a:r>
+              <a:rPr lang="hr-HR" dirty="0" err="1" smtClean="0"/>
+              <a:t>and</a:t>
+            </a:r>
+            <a:r>
+              <a:rPr lang="hr-HR" dirty="0" smtClean="0"/>
+              <a:t> </a:t>
+            </a:r>
+            <a:r>
+              <a:rPr lang="hr-HR" dirty="0" err="1" smtClean="0"/>
+              <a:t>debug</a:t>
+            </a:r>
+            <a:endParaRPr lang="hr-HR" dirty="0" smtClean="0"/>
+          </a:p>
+          <a:p>
+            <a:pPr lvl="1"/>
+            <a:r>
+              <a:rPr lang="hr-HR" dirty="0" err="1" smtClean="0"/>
+              <a:t>Kompajliranje</a:t>
+            </a:r>
+            <a:r>
+              <a:rPr lang="hr-HR" dirty="0" smtClean="0"/>
+              <a:t> i </a:t>
+            </a:r>
+            <a:r>
+              <a:rPr lang="hr-HR" dirty="0" err="1" smtClean="0"/>
+              <a:t>debugiranje</a:t>
+            </a:r>
+            <a:r>
+              <a:rPr lang="hr-HR" dirty="0" smtClean="0"/>
+              <a:t> na jedan klik</a:t>
+            </a:r>
+          </a:p>
+          <a:p>
+            <a:pPr lvl="1"/>
+            <a:r>
+              <a:rPr lang="hr-HR" dirty="0" smtClean="0"/>
+              <a:t>Mogućnost kreiranja </a:t>
+            </a:r>
+            <a:r>
+              <a:rPr lang="hr-HR" dirty="0" err="1" smtClean="0"/>
+              <a:t>Memory</a:t>
+            </a:r>
+            <a:r>
+              <a:rPr lang="hr-HR" dirty="0" smtClean="0"/>
+              <a:t> </a:t>
+            </a:r>
+            <a:r>
+              <a:rPr lang="hr-HR" dirty="0" err="1" smtClean="0"/>
+              <a:t>dumpa</a:t>
+            </a:r>
+            <a:endParaRPr lang="hr-HR" dirty="0" smtClean="0"/>
+          </a:p>
+          <a:p>
+            <a:pPr lvl="1"/>
+            <a:r>
+              <a:rPr lang="hr-HR" dirty="0" err="1" smtClean="0"/>
+              <a:t>Conditional</a:t>
+            </a:r>
+            <a:r>
+              <a:rPr lang="hr-HR" dirty="0" smtClean="0"/>
+              <a:t> </a:t>
+            </a:r>
+            <a:r>
+              <a:rPr lang="hr-HR" dirty="0" err="1" smtClean="0"/>
+              <a:t>breakpoints</a:t>
+            </a:r>
+            <a:r>
+              <a:rPr lang="hr-HR" dirty="0" smtClean="0"/>
+              <a:t>, </a:t>
+            </a:r>
+            <a:r>
+              <a:rPr lang="hr-HR" dirty="0" err="1" smtClean="0"/>
+              <a:t>watches</a:t>
+            </a:r>
+            <a:r>
+              <a:rPr lang="hr-HR" dirty="0" smtClean="0"/>
+              <a:t>, </a:t>
+            </a:r>
+            <a:r>
+              <a:rPr lang="hr-HR" dirty="0" err="1" smtClean="0"/>
+              <a:t>immediate</a:t>
+            </a:r>
+            <a:r>
+              <a:rPr lang="hr-HR" dirty="0" smtClean="0"/>
+              <a:t> window</a:t>
+            </a:r>
+          </a:p>
+          <a:p>
+            <a:r>
+              <a:rPr lang="hr-HR" dirty="0" err="1" smtClean="0"/>
+              <a:t>Performance</a:t>
+            </a:r>
+            <a:r>
+              <a:rPr lang="hr-HR" dirty="0" smtClean="0"/>
+              <a:t> </a:t>
+            </a:r>
+            <a:r>
+              <a:rPr lang="hr-HR" dirty="0" err="1" smtClean="0"/>
+              <a:t>and</a:t>
+            </a:r>
+            <a:r>
+              <a:rPr lang="hr-HR" dirty="0" smtClean="0"/>
+              <a:t> </a:t>
+            </a:r>
+            <a:r>
+              <a:rPr lang="hr-HR" dirty="0" err="1" smtClean="0"/>
+              <a:t>Diagnostics</a:t>
+            </a:r>
+            <a:r>
+              <a:rPr lang="hr-HR" dirty="0" smtClean="0"/>
+              <a:t> (</a:t>
+            </a:r>
+            <a:r>
+              <a:rPr lang="hr-HR" dirty="0" err="1" smtClean="0"/>
+              <a:t>profilers</a:t>
+            </a:r>
+            <a:r>
+              <a:rPr lang="hr-HR" dirty="0" smtClean="0"/>
+              <a:t>)</a:t>
+            </a:r>
+          </a:p>
+          <a:p>
+            <a:pPr lvl="1"/>
+            <a:r>
+              <a:rPr lang="hr-HR" dirty="0" smtClean="0"/>
+              <a:t>Prate rad CPU-a, korištenje memorije i druge podatke o radu aplikacije</a:t>
+            </a:r>
+          </a:p>
+          <a:p>
+            <a:pPr marL="457200" lvl="1" indent="0">
+              <a:buNone/>
+            </a:pPr>
+            <a:endParaRPr lang="hr-HR" dirty="0" smtClean="0"/>
+          </a:p>
+          <a:p>
+            <a:pPr lvl="1"/>
+            <a:endParaRPr lang="hr-HR" dirty="0"/>
+          </a:p>
+        </p:txBody>
+      </p:sp>
+    </p:spTree>
+    <p:extLst>
+      <p:ext uri="{BB962C8B-B14F-4D97-AF65-F5344CB8AC3E}">
+        <p14:creationId xmlns:p14="http://schemas.microsoft.com/office/powerpoint/2010/main" val="477603348"/>
+      </p:ext>
+    </p:extLst>
+  </p:cSld>
+  <p:clrMapOvr>
+    <a:masterClrMapping/>
+  </p:clrMapOvr>
+</p:sld>
+</file>
+
+<file path=ppt/slides/slide14.xml><?xml version="1.0" encoding="utf-8"?>
+<p:sld xmlns:a="http://schemas.openxmlformats.org/drawingml/2006/main" xmlns:r="http://schemas.openxmlformats.org/officeDocument/2006/relationships" xmlns:p="http://schemas.openxmlformats.org/presentationml/2006/main">
+  <p:cSld>
+    <p:spTree>
+      <p:nvGrpSpPr>
+        <p:cNvPr id="1" name=""/>
+        <p:cNvGrpSpPr/>
+        <p:nvPr/>
+      </p:nvGrpSpPr>
+      <p:grpSpPr>
+        <a:xfrm>
+          <a:off x="0" y="0"/>
+          <a:ext cx="0" cy="0"/>
+          <a:chOff x="0" y="0"/>
+          <a:chExt cx="0" cy="0"/>
+        </a:xfrm>
+      </p:grpSpPr>
+      <p:sp>
+        <p:nvSpPr>
+          <p:cNvPr id="2" name="Title 1"/>
+          <p:cNvSpPr>
+            <a:spLocks noGrp="1"/>
+          </p:cNvSpPr>
+          <p:nvPr>
+            <p:ph type="title"/>
+          </p:nvPr>
+        </p:nvSpPr>
+        <p:spPr/>
+        <p:txBody>
+          <a:bodyPr/>
+          <a:lstStyle/>
+          <a:p>
+            <a:r>
+              <a:rPr lang="hr-HR" dirty="0" err="1" smtClean="0"/>
+              <a:t>Visual</a:t>
+            </a:r>
+            <a:r>
+              <a:rPr lang="hr-HR" dirty="0" smtClean="0"/>
+              <a:t> Studio</a:t>
+            </a:r>
+            <a:endParaRPr lang="hr-HR" dirty="0"/>
+          </a:p>
+        </p:txBody>
+      </p:sp>
+      <p:sp>
+        <p:nvSpPr>
+          <p:cNvPr id="3" name="Content Placeholder 2"/>
+          <p:cNvSpPr>
+            <a:spLocks noGrp="1"/>
+          </p:cNvSpPr>
+          <p:nvPr>
+            <p:ph idx="1"/>
+          </p:nvPr>
+        </p:nvSpPr>
         <p:spPr>
           <a:xfrm>
             <a:off x="838200" y="1825625"/>
@@ -4841,7 +4871,6 @@
               <a:rPr lang="hr-HR" dirty="0" smtClean="0"/>
               <a:t> koda i razvoj u timskom okruženju</a:t>
             </a:r>
-            <a:endParaRPr lang="hr-HR" dirty="0" smtClean="0"/>
           </a:p>
           <a:p>
             <a:pPr marL="457200" lvl="1" indent="0">
@@ -4898,153 +4927,6 @@
 </p:sld>
 </file>
 
-<file path=ppt/slides/slide14.xml><?xml version="1.0" encoding="utf-8"?>
-<p:sld xmlns:a="http://schemas.openxmlformats.org/drawingml/2006/main" xmlns:r="http://schemas.openxmlformats.org/officeDocument/2006/relationships" xmlns:p="http://schemas.openxmlformats.org/presentationml/2006/main">
-  <p:cSld>
-    <p:spTree>
-      <p:nvGrpSpPr>
-        <p:cNvPr id="1" name=""/>
-        <p:cNvGrpSpPr/>
-        <p:nvPr/>
-      </p:nvGrpSpPr>
-      <p:grpSpPr>
-        <a:xfrm>
-          <a:off x="0" y="0"/>
-          <a:ext cx="0" cy="0"/>
-          <a:chOff x="0" y="0"/>
-          <a:chExt cx="0" cy="0"/>
-        </a:xfrm>
-      </p:grpSpPr>
-      <p:sp>
-        <p:nvSpPr>
-          <p:cNvPr id="2" name="Title 1"/>
-          <p:cNvSpPr>
-            <a:spLocks noGrp="1"/>
-          </p:cNvSpPr>
-          <p:nvPr>
-            <p:ph type="title"/>
-          </p:nvPr>
-        </p:nvSpPr>
-        <p:spPr/>
-        <p:txBody>
-          <a:bodyPr/>
-          <a:lstStyle/>
-          <a:p>
-            <a:r>
-              <a:rPr lang="hr-HR" dirty="0" smtClean="0"/>
-              <a:t>Microsoft ALM proizvodi</a:t>
-            </a:r>
-            <a:endParaRPr lang="hr-HR" dirty="0"/>
-          </a:p>
-        </p:txBody>
-      </p:sp>
-      <p:sp>
-        <p:nvSpPr>
-          <p:cNvPr id="3" name="Content Placeholder 2"/>
-          <p:cNvSpPr>
-            <a:spLocks noGrp="1"/>
-          </p:cNvSpPr>
-          <p:nvPr>
-            <p:ph sz="quarter" idx="1"/>
-          </p:nvPr>
-        </p:nvSpPr>
-        <p:spPr/>
-        <p:txBody>
-          <a:bodyPr>
-            <a:normAutofit/>
-          </a:bodyPr>
-          <a:lstStyle/>
-          <a:p>
-            <a:r>
-              <a:rPr lang="hr-HR" dirty="0" smtClean="0"/>
-              <a:t>Visual Studio (IDE)</a:t>
-            </a:r>
-          </a:p>
-          <a:p>
-            <a:r>
-              <a:rPr lang="hr-HR" dirty="0" smtClean="0"/>
-              <a:t>Visual Studio Test Professional</a:t>
-            </a:r>
-          </a:p>
-          <a:p>
-            <a:pPr lvl="1"/>
-            <a:r>
-              <a:rPr lang="hr-HR" dirty="0"/>
-              <a:t>Continuous delivery </a:t>
-            </a:r>
-            <a:endParaRPr lang="hr-HR" dirty="0" smtClean="0"/>
-          </a:p>
-          <a:p>
-            <a:pPr lvl="1"/>
-            <a:r>
-              <a:rPr lang="hr-HR" dirty="0" smtClean="0"/>
-              <a:t>Alat za test timove – upravljanje, kreiranje, izvršavanje i reporting</a:t>
-            </a:r>
-          </a:p>
-          <a:p>
-            <a:pPr lvl="1"/>
-            <a:r>
-              <a:rPr lang="hr-HR" dirty="0"/>
-              <a:t>Microsoft Test Manager</a:t>
-            </a:r>
-          </a:p>
-          <a:p>
-            <a:pPr lvl="2"/>
-            <a:r>
-              <a:rPr lang="hr-HR" dirty="0" smtClean="0"/>
-              <a:t>Pokretanje</a:t>
-            </a:r>
-            <a:r>
-              <a:rPr lang="en-US" dirty="0" smtClean="0"/>
-              <a:t>, </a:t>
-            </a:r>
-            <a:r>
-              <a:rPr lang="hr-HR" dirty="0" smtClean="0"/>
-              <a:t>snimanje-slanje rezultata ručnih testova, user acceptance testers</a:t>
-            </a:r>
-          </a:p>
-          <a:p>
-            <a:r>
-              <a:rPr lang="hr-HR" dirty="0" smtClean="0"/>
-              <a:t>Team Foundation Server</a:t>
-            </a:r>
-          </a:p>
-          <a:p>
-            <a:pPr lvl="1"/>
-            <a:r>
-              <a:rPr lang="hr-HR" dirty="0" smtClean="0"/>
-              <a:t>Source Control, Data Storage, Builds</a:t>
-            </a:r>
-          </a:p>
-          <a:p>
-            <a:r>
-              <a:rPr lang="hr-HR" dirty="0" smtClean="0"/>
-              <a:t>Visual Studio Lab Management</a:t>
-            </a:r>
-          </a:p>
-          <a:p>
-            <a:pPr lvl="1"/>
-            <a:r>
-              <a:rPr lang="hr-HR" dirty="0" smtClean="0"/>
-              <a:t>Upravljanje virtualnim okruženjima od strane testera</a:t>
-            </a:r>
-            <a:endParaRPr lang="hr-HR" dirty="0"/>
-          </a:p>
-        </p:txBody>
-      </p:sp>
-    </p:spTree>
-    <p:extLst>
-      <p:ext uri="{BB962C8B-B14F-4D97-AF65-F5344CB8AC3E}">
-        <p14:creationId xmlns:p14="http://schemas.microsoft.com/office/powerpoint/2010/main" val="588679883"/>
-      </p:ext>
-    </p:extLst>
-  </p:cSld>
-  <p:clrMapOvr>
-    <a:masterClrMapping/>
-  </p:clrMapOvr>
-</p:sld>
-</file>
-
 <file path=ppt/slides/slide15.xml><?xml version="1.0" encoding="utf-8"?>
 <p:sld xmlns:a="http://schemas.openxmlformats.org/drawingml/2006/main" xmlns:r="http://schemas.openxmlformats.org/officeDocument/2006/relationships" xmlns:p="http://schemas.openxmlformats.org/presentationml/2006/main">
   <p:cSld>
@@ -5079,6 +4961,153 @@
           <a:p>
             <a:r>
               <a:rPr lang="hr-HR" dirty="0" smtClean="0"/>
+              <a:t>Microsoft ALM proizvodi</a:t>
+            </a:r>
+            <a:endParaRPr lang="hr-HR" dirty="0"/>
+          </a:p>
+        </p:txBody>
+      </p:sp>
+      <p:sp>
+        <p:nvSpPr>
+          <p:cNvPr id="3" name="Content Placeholder 2"/>
+          <p:cNvSpPr>
+            <a:spLocks noGrp="1"/>
+          </p:cNvSpPr>
+          <p:nvPr>
+            <p:ph sz="quarter" idx="1"/>
+          </p:nvPr>
+        </p:nvSpPr>
+        <p:spPr/>
+        <p:txBody>
+          <a:bodyPr>
+            <a:normAutofit/>
+          </a:bodyPr>
+          <a:lstStyle/>
+          <a:p>
+            <a:r>
+              <a:rPr lang="hr-HR" dirty="0" smtClean="0"/>
+              <a:t>Visual Studio (IDE)</a:t>
+            </a:r>
+          </a:p>
+          <a:p>
+            <a:r>
+              <a:rPr lang="hr-HR" dirty="0" smtClean="0"/>
+              <a:t>Visual Studio Test Professional</a:t>
+            </a:r>
+          </a:p>
+          <a:p>
+            <a:pPr lvl="1"/>
+            <a:r>
+              <a:rPr lang="hr-HR" dirty="0"/>
+              <a:t>Continuous delivery </a:t>
+            </a:r>
+            <a:endParaRPr lang="hr-HR" dirty="0" smtClean="0"/>
+          </a:p>
+          <a:p>
+            <a:pPr lvl="1"/>
+            <a:r>
+              <a:rPr lang="hr-HR" dirty="0" smtClean="0"/>
+              <a:t>Alat za test timove – upravljanje, kreiranje, izvršavanje i reporting</a:t>
+            </a:r>
+          </a:p>
+          <a:p>
+            <a:pPr lvl="1"/>
+            <a:r>
+              <a:rPr lang="hr-HR" dirty="0"/>
+              <a:t>Microsoft Test Manager</a:t>
+            </a:r>
+          </a:p>
+          <a:p>
+            <a:pPr lvl="2"/>
+            <a:r>
+              <a:rPr lang="hr-HR" dirty="0" smtClean="0"/>
+              <a:t>Pokretanje</a:t>
+            </a:r>
+            <a:r>
+              <a:rPr lang="en-US" dirty="0" smtClean="0"/>
+              <a:t>, </a:t>
+            </a:r>
+            <a:r>
+              <a:rPr lang="hr-HR" dirty="0" smtClean="0"/>
+              <a:t>snimanje-slanje rezultata ručnih testova, user acceptance testers</a:t>
+            </a:r>
+          </a:p>
+          <a:p>
+            <a:r>
+              <a:rPr lang="hr-HR" dirty="0" smtClean="0"/>
+              <a:t>Team Foundation Server</a:t>
+            </a:r>
+          </a:p>
+          <a:p>
+            <a:pPr lvl="1"/>
+            <a:r>
+              <a:rPr lang="hr-HR" dirty="0" smtClean="0"/>
+              <a:t>Source Control, Data Storage, Builds</a:t>
+            </a:r>
+          </a:p>
+          <a:p>
+            <a:r>
+              <a:rPr lang="hr-HR" dirty="0" smtClean="0"/>
+              <a:t>Visual Studio Lab Management</a:t>
+            </a:r>
+          </a:p>
+          <a:p>
+            <a:pPr lvl="1"/>
+            <a:r>
+              <a:rPr lang="hr-HR" dirty="0" smtClean="0"/>
+              <a:t>Upravljanje virtualnim okruženjima od strane testera</a:t>
+            </a:r>
+            <a:endParaRPr lang="hr-HR" dirty="0"/>
+          </a:p>
+        </p:txBody>
+      </p:sp>
+    </p:spTree>
+    <p:extLst>
+      <p:ext uri="{BB962C8B-B14F-4D97-AF65-F5344CB8AC3E}">
+        <p14:creationId xmlns:p14="http://schemas.microsoft.com/office/powerpoint/2010/main" val="588679883"/>
+      </p:ext>
+    </p:extLst>
+  </p:cSld>
+  <p:clrMapOvr>
+    <a:masterClrMapping/>
+  </p:clrMapOvr>
+</p:sld>
+</file>
+
+<file path=ppt/slides/slide16.xml><?xml version="1.0" encoding="utf-8"?>
+<p:sld xmlns:a="http://schemas.openxmlformats.org/drawingml/2006/main" xmlns:r="http://schemas.openxmlformats.org/officeDocument/2006/relationships" xmlns:p="http://schemas.openxmlformats.org/presentationml/2006/main">
+  <p:cSld>
+    <p:spTree>
+      <p:nvGrpSpPr>
+        <p:cNvPr id="1" name=""/>
+        <p:cNvGrpSpPr/>
+        <p:nvPr/>
+      </p:nvGrpSpPr>
+      <p:grpSpPr>
+        <a:xfrm>
+          <a:off x="0" y="0"/>
+          <a:ext cx="0" cy="0"/>
+          <a:chOff x="0" y="0"/>
+          <a:chExt cx="0" cy="0"/>
+        </a:xfrm>
+      </p:grpSpPr>
+      <p:sp>
+        <p:nvSpPr>
+          <p:cNvPr id="2" name="Title 1"/>
+          <p:cNvSpPr>
+            <a:spLocks noGrp="1"/>
+          </p:cNvSpPr>
+          <p:nvPr>
+            <p:ph type="title"/>
+          </p:nvPr>
+        </p:nvSpPr>
+        <p:spPr/>
+        <p:txBody>
+          <a:bodyPr/>
+          <a:lstStyle/>
+          <a:p>
+            <a:r>
+              <a:rPr lang="hr-HR" dirty="0" smtClean="0"/>
               <a:t>VS ALM</a:t>
             </a:r>
             <a:endParaRPr lang="hr-HR" dirty="0"/>
@@ -5193,7 +5222,7 @@
 </p:sld>
 </file>
 
-<file path=ppt/slides/slide16.xml><?xml version="1.0" encoding="utf-8"?>
+<file path=ppt/slides/slide17.xml><?xml version="1.0" encoding="utf-8"?>
 <p:sld xmlns:a="http://schemas.openxmlformats.org/drawingml/2006/main" xmlns:r="http://schemas.openxmlformats.org/officeDocument/2006/relationships" xmlns:p="http://schemas.openxmlformats.org/presentationml/2006/main">
   <p:cSld>
     <p:spTree>
@@ -7324,7 +7353,7 @@
 </p:sld>
 </file>
 
-<file path=ppt/slides/slide17.xml><?xml version="1.0" encoding="utf-8"?>
+<file path=ppt/slides/slide18.xml><?xml version="1.0" encoding="utf-8"?>
 <p:sld xmlns:a="http://schemas.openxmlformats.org/drawingml/2006/main" xmlns:r="http://schemas.openxmlformats.org/officeDocument/2006/relationships" xmlns:p="http://schemas.openxmlformats.org/presentationml/2006/main">
   <p:cSld>
     <p:spTree>
@@ -7410,13 +7439,8 @@
             <a:pPr lvl="1"/>
             <a:r>
               <a:rPr lang="hr-HR" dirty="0" smtClean="0"/>
-              <a:t>Brži od </a:t>
-            </a:r>
-            <a:r>
-              <a:rPr lang="hr-HR" dirty="0" smtClean="0"/>
-              <a:t>VS-a</a:t>
-            </a:r>
-            <a:endParaRPr lang="hr-HR" dirty="0" smtClean="0"/>
+              <a:t>Brži od VS-a</a:t>
+            </a:r>
           </a:p>
           <a:p>
             <a:pPr lvl="1"/>
@@ -7441,11 +7465,7 @@
             </a:r>
             <a:r>
               <a:rPr lang="hr-HR" dirty="0" smtClean="0"/>
-              <a:t>inuxu </a:t>
-            </a:r>
-            <a:r>
-              <a:rPr lang="hr-HR" dirty="0" smtClean="0"/>
-              <a:t>i </a:t>
+              <a:t>inuxu i </a:t>
             </a:r>
             <a:r>
               <a:rPr lang="hr-HR" dirty="0" err="1" smtClean="0"/>
@@ -7520,7 +7540,7 @@
 </p:sld>
 </file>
 
-<file path=ppt/slides/slide18.xml><?xml version="1.0" encoding="utf-8"?>
+<file path=ppt/slides/slide19.xml><?xml version="1.0" encoding="utf-8"?>
 <p:sld xmlns:a="http://schemas.openxmlformats.org/drawingml/2006/main" xmlns:r="http://schemas.openxmlformats.org/officeDocument/2006/relationships" xmlns:p="http://schemas.openxmlformats.org/presentationml/2006/main">
   <p:cSld>
     <p:spTree>
@@ -7704,7 +7724,7 @@
 </p:sld>
 </file>
 
-<file path=ppt/slides/slide19.xml><?xml version="1.0" encoding="utf-8"?>
+<file path=ppt/slides/slide2.xml><?xml version="1.0" encoding="utf-8"?>
 <p:sld xmlns:a="http://schemas.openxmlformats.org/drawingml/2006/main" xmlns:r="http://schemas.openxmlformats.org/officeDocument/2006/relationships" xmlns:p="http://schemas.openxmlformats.org/presentationml/2006/main">
   <p:cSld>
     <p:spTree>
@@ -7737,12 +7757,225 @@
           <a:lstStyle/>
           <a:p>
             <a:r>
-              <a:rPr lang="hr-HR" dirty="0" smtClean="0"/>
-              <a:t>Podrška </a:t>
-            </a:r>
-            <a:r>
-              <a:rPr lang="hr-HR" dirty="0" smtClean="0"/>
-              <a:t>za </a:t>
+              <a:rPr lang="hr-HR" dirty="0" err="1"/>
+              <a:t>Visual</a:t>
+            </a:r>
+            <a:r>
+              <a:rPr lang="hr-HR" dirty="0"/>
+              <a:t> </a:t>
+            </a:r>
+            <a:r>
+              <a:rPr lang="hr-HR" dirty="0" smtClean="0"/>
+              <a:t>Studio</a:t>
+            </a:r>
+            <a:endParaRPr lang="hr-HR" dirty="0"/>
+          </a:p>
+        </p:txBody>
+      </p:sp>
+      <p:sp>
+        <p:nvSpPr>
+          <p:cNvPr id="3" name="Content Placeholder 2"/>
+          <p:cNvSpPr>
+            <a:spLocks noGrp="1"/>
+          </p:cNvSpPr>
+          <p:nvPr>
+            <p:ph idx="1"/>
+          </p:nvPr>
+        </p:nvSpPr>
+        <p:spPr>
+          <a:xfrm>
+            <a:off x="5205844" y="1825625"/>
+            <a:ext cx="6147955" cy="4351338"/>
+          </a:xfrm>
+        </p:spPr>
+        <p:txBody>
+          <a:bodyPr/>
+          <a:lstStyle/>
+          <a:p>
+            <a:r>
+              <a:rPr lang="hr-HR" dirty="0" err="1" smtClean="0"/>
+              <a:t>Visual</a:t>
+            </a:r>
+            <a:r>
+              <a:rPr lang="hr-HR" dirty="0" smtClean="0"/>
+              <a:t> Studio 97 (v5.0 – v6.0)</a:t>
+            </a:r>
+          </a:p>
+          <a:p>
+            <a:pPr lvl="1"/>
+            <a:r>
+              <a:rPr lang="hr-HR" dirty="0" smtClean="0"/>
+              <a:t>J++, InterDev, C++, </a:t>
+            </a:r>
+            <a:r>
+              <a:rPr lang="hr-HR" dirty="0" err="1" smtClean="0"/>
+              <a:t>Basic</a:t>
+            </a:r>
+            <a:r>
+              <a:rPr lang="hr-HR" dirty="0" smtClean="0"/>
+              <a:t>, FoxPro</a:t>
+            </a:r>
+          </a:p>
+          <a:p>
+            <a:r>
+              <a:rPr lang="hr-HR" dirty="0" err="1" smtClean="0"/>
+              <a:t>Visual</a:t>
+            </a:r>
+            <a:r>
+              <a:rPr lang="hr-HR" dirty="0" smtClean="0"/>
+              <a:t> Studio .NET (2002)</a:t>
+            </a:r>
+          </a:p>
+          <a:p>
+            <a:pPr lvl="1"/>
+            <a:r>
+              <a:rPr lang="hr-HR" dirty="0" smtClean="0"/>
+              <a:t>.NET Framework 1.0</a:t>
+            </a:r>
+          </a:p>
+          <a:p>
+            <a:pPr lvl="1"/>
+            <a:r>
+              <a:rPr lang="hr-HR" dirty="0" err="1" smtClean="0"/>
+              <a:t>Basic</a:t>
+            </a:r>
+            <a:r>
+              <a:rPr lang="hr-HR" dirty="0" smtClean="0"/>
+              <a:t> .NET, C#</a:t>
+            </a:r>
+          </a:p>
+          <a:p>
+            <a:r>
+              <a:rPr lang="hr-HR" dirty="0" err="1" smtClean="0"/>
+              <a:t>Visual</a:t>
+            </a:r>
+            <a:r>
+              <a:rPr lang="hr-HR" dirty="0" smtClean="0"/>
+              <a:t> Studio 2005</a:t>
+            </a:r>
+          </a:p>
+          <a:p>
+            <a:pPr lvl="1"/>
+            <a:r>
+              <a:rPr lang="hr-HR" dirty="0" smtClean="0"/>
+              <a:t>.NET Framework 2.0/3.0</a:t>
+            </a:r>
+          </a:p>
+          <a:p>
+            <a:pPr lvl="1"/>
+            <a:r>
+              <a:rPr lang="hr-HR" dirty="0" smtClean="0"/>
+              <a:t>64-bit </a:t>
+            </a:r>
+            <a:r>
+              <a:rPr lang="hr-HR" dirty="0" err="1" smtClean="0"/>
+              <a:t>support</a:t>
+            </a:r>
+            <a:endParaRPr lang="hr-HR" dirty="0" smtClean="0"/>
+          </a:p>
+          <a:p>
+            <a:pPr lvl="1"/>
+            <a:r>
+              <a:rPr lang="hr-HR" dirty="0" smtClean="0"/>
+              <a:t>Automatski </a:t>
+            </a:r>
+            <a:r>
+              <a:rPr lang="hr-HR" dirty="0" err="1" smtClean="0"/>
+              <a:t>IntelliSense</a:t>
+            </a:r>
+            <a:endParaRPr lang="hr-HR" dirty="0" smtClean="0"/>
+          </a:p>
+          <a:p>
+            <a:pPr lvl="1"/>
+            <a:endParaRPr lang="hr-HR" dirty="0" smtClean="0"/>
+          </a:p>
+        </p:txBody>
+      </p:sp>
+      <p:pic>
+        <p:nvPicPr>
+          <p:cNvPr id="4" name="Picture 3"/>
+          <p:cNvPicPr>
+            <a:picLocks noChangeAspect="1"/>
+          </p:cNvPicPr>
+          <p:nvPr/>
+        </p:nvPicPr>
+        <p:blipFill>
+          <a:blip r:embed="rId3">
+            <a:extLst>
+              <a:ext uri="{28A0092B-C50C-407E-A947-70E740481C1C}">
+                <a14:useLocalDpi xmlns:a14="http://schemas.microsoft.com/office/drawing/2010/main" val="0"/>
+              </a:ext>
+            </a:extLst>
+          </a:blip>
+          <a:stretch>
+            <a:fillRect/>
+          </a:stretch>
+        </p:blipFill>
+        <p:spPr>
+          <a:xfrm>
+            <a:off x="942109" y="1620044"/>
+            <a:ext cx="3867150" cy="4762500"/>
+          </a:xfrm>
+          <a:prstGeom prst="rect">
+            <a:avLst/>
+          </a:prstGeom>
+        </p:spPr>
+      </p:pic>
+    </p:spTree>
+    <p:extLst>
+      <p:ext uri="{BB962C8B-B14F-4D97-AF65-F5344CB8AC3E}">
+        <p14:creationId xmlns:p14="http://schemas.microsoft.com/office/powerpoint/2010/main" val="1191203112"/>
+      </p:ext>
+    </p:extLst>
+  </p:cSld>
+  <p:clrMapOvr>
+    <a:masterClrMapping/>
+  </p:clrMapOvr>
+  <p:timing>
+    <p:tnLst>
+      <p:par>
+        <p:cTn id="1" dur="indefinite" restart="never" nodeType="tmRoot"/>
+      </p:par>
+    </p:tnLst>
+  </p:timing>
+</p:sld>
+</file>
+
+<file path=ppt/slides/slide20.xml><?xml version="1.0" encoding="utf-8"?>
+<p:sld xmlns:a="http://schemas.openxmlformats.org/drawingml/2006/main" xmlns:r="http://schemas.openxmlformats.org/officeDocument/2006/relationships" xmlns:p="http://schemas.openxmlformats.org/presentationml/2006/main">
+  <p:cSld>
+    <p:spTree>
+      <p:nvGrpSpPr>
+        <p:cNvPr id="1" name=""/>
+        <p:cNvGrpSpPr/>
+        <p:nvPr/>
+      </p:nvGrpSpPr>
+      <p:grpSpPr>
+        <a:xfrm>
+          <a:off x="0" y="0"/>
+          <a:ext cx="0" cy="0"/>
+          <a:chOff x="0" y="0"/>
+          <a:chExt cx="0" cy="0"/>
+        </a:xfrm>
+      </p:grpSpPr>
+      <p:sp>
+        <p:nvSpPr>
+          <p:cNvPr id="2" name="Title 1"/>
+          <p:cNvSpPr>
+            <a:spLocks noGrp="1"/>
+          </p:cNvSpPr>
+          <p:nvPr>
+            <p:ph type="title"/>
+          </p:nvPr>
+        </p:nvSpPr>
+        <p:spPr/>
+        <p:txBody>
+          <a:bodyPr/>
+          <a:lstStyle/>
+          <a:p>
+            <a:r>
+              <a:rPr lang="hr-HR" dirty="0" smtClean="0"/>
+              <a:t>Podrška za </a:t>
             </a:r>
             <a:r>
               <a:rPr lang="hr-HR" dirty="0" err="1" smtClean="0"/>
@@ -7750,11 +7983,7 @@
             </a:r>
             <a:r>
               <a:rPr lang="hr-HR" dirty="0" smtClean="0"/>
-              <a:t> </a:t>
-            </a:r>
-            <a:r>
-              <a:rPr lang="hr-HR" dirty="0" smtClean="0"/>
-              <a:t>managere</a:t>
+              <a:t> managere</a:t>
             </a:r>
             <a:endParaRPr lang="hr-HR" dirty="0"/>
           </a:p>
@@ -7820,7 +8049,6 @@
               <a:rPr lang="hr-HR" dirty="0" smtClean="0"/>
               <a:t> o kojima projekt ovisi </a:t>
             </a:r>
-            <a:endParaRPr lang="hr-HR" dirty="0" smtClean="0"/>
           </a:p>
           <a:p>
             <a:endParaRPr lang="hr-HR" dirty="0"/>
@@ -7864,7 +8092,7 @@
 </p:sld>
 </file>
 
-<file path=ppt/slides/slide2.xml><?xml version="1.0" encoding="utf-8"?>
+<file path=ppt/slides/slide3.xml><?xml version="1.0" encoding="utf-8"?>
 <p:sld xmlns:a="http://schemas.openxmlformats.org/drawingml/2006/main" xmlns:r="http://schemas.openxmlformats.org/officeDocument/2006/relationships" xmlns:p="http://schemas.openxmlformats.org/presentationml/2006/main">
   <p:cSld>
     <p:spTree>
@@ -8078,549 +8306,6 @@
 </p:sld>
 </file>
 
-<file path=ppt/slides/slide3.xml><?xml version="1.0" encoding="utf-8"?>
-<p:sld xmlns:a="http://schemas.openxmlformats.org/drawingml/2006/main" xmlns:r="http://schemas.openxmlformats.org/officeDocument/2006/relationships" xmlns:p="http://schemas.openxmlformats.org/presentationml/2006/main">
-  <p:cSld>
-    <p:spTree>
-      <p:nvGrpSpPr>
-        <p:cNvPr id="1" name=""/>
-        <p:cNvGrpSpPr/>
-        <p:nvPr/>
-      </p:nvGrpSpPr>
-      <p:grpSpPr>
-        <a:xfrm>
-          <a:off x="0" y="0"/>
-          <a:ext cx="0" cy="0"/>
-          <a:chOff x="0" y="0"/>
-          <a:chExt cx="0" cy="0"/>
-        </a:xfrm>
-      </p:grpSpPr>
-      <p:sp>
-        <p:nvSpPr>
-          <p:cNvPr id="2" name="Title 1"/>
-          <p:cNvSpPr>
-            <a:spLocks noGrp="1"/>
-          </p:cNvSpPr>
-          <p:nvPr>
-            <p:ph type="title"/>
-          </p:nvPr>
-        </p:nvSpPr>
-        <p:spPr/>
-        <p:txBody>
-          <a:bodyPr/>
-          <a:lstStyle/>
-          <a:p>
-            <a:r>
-              <a:rPr lang="hr-HR" dirty="0" err="1" smtClean="0"/>
-              <a:t>Visual</a:t>
-            </a:r>
-            <a:r>
-              <a:rPr lang="hr-HR" dirty="0" smtClean="0"/>
-              <a:t> Studio 2017 </a:t>
-            </a:r>
-            <a:r>
-              <a:rPr lang="hr-HR" dirty="0" err="1" smtClean="0"/>
-              <a:t>Community</a:t>
-            </a:r>
-            <a:endParaRPr lang="hr-HR" dirty="0"/>
-          </a:p>
-        </p:txBody>
-      </p:sp>
-      <p:sp>
-        <p:nvSpPr>
-          <p:cNvPr id="3" name="Content Placeholder 2"/>
-          <p:cNvSpPr>
-            <a:spLocks noGrp="1"/>
-          </p:cNvSpPr>
-          <p:nvPr>
-            <p:ph idx="1"/>
-          </p:nvPr>
-        </p:nvSpPr>
-        <p:spPr/>
-        <p:txBody>
-          <a:bodyPr>
-            <a:normAutofit lnSpcReduction="10000"/>
-          </a:bodyPr>
-          <a:lstStyle/>
-          <a:p>
-            <a:r>
-              <a:rPr lang="hr-HR" dirty="0" smtClean="0"/>
-              <a:t>Potpuno slobodan za pojedince</a:t>
-            </a:r>
-          </a:p>
-          <a:p>
-            <a:r>
-              <a:rPr lang="hr-HR" dirty="0" smtClean="0"/>
-              <a:t>Za organizacije:</a:t>
-            </a:r>
-          </a:p>
-          <a:p>
-            <a:pPr lvl="1"/>
-            <a:r>
-              <a:rPr lang="hr-HR" dirty="0" smtClean="0"/>
-              <a:t>Slobodan za razvoj aplikacija pod OSI </a:t>
-            </a:r>
-            <a:r>
-              <a:rPr lang="hr-HR" dirty="0" err="1" smtClean="0"/>
-              <a:t>open</a:t>
-            </a:r>
-            <a:r>
-              <a:rPr lang="hr-HR" dirty="0" smtClean="0"/>
-              <a:t> </a:t>
-            </a:r>
-            <a:r>
-              <a:rPr lang="hr-HR" dirty="0" err="1" smtClean="0"/>
-              <a:t>source</a:t>
-            </a:r>
-            <a:r>
-              <a:rPr lang="hr-HR" dirty="0" smtClean="0"/>
-              <a:t> licencama:</a:t>
-            </a:r>
-          </a:p>
-          <a:p>
-            <a:pPr lvl="2"/>
-            <a:r>
-              <a:rPr lang="hr-HR" dirty="0">
-                <a:cs typeface="Aldhabi" panose="01000000000000000000" pitchFamily="2" charset="-78"/>
-                <a:hlinkClick r:id="rId2"/>
-              </a:rPr>
-              <a:t>Apache </a:t>
-            </a:r>
-            <a:r>
-              <a:rPr lang="hr-HR" dirty="0" err="1">
-                <a:cs typeface="Aldhabi" panose="01000000000000000000" pitchFamily="2" charset="-78"/>
-                <a:hlinkClick r:id="rId2"/>
-              </a:rPr>
-              <a:t>License</a:t>
-            </a:r>
-            <a:r>
-              <a:rPr lang="hr-HR" dirty="0">
-                <a:cs typeface="Aldhabi" panose="01000000000000000000" pitchFamily="2" charset="-78"/>
-                <a:hlinkClick r:id="rId2"/>
-              </a:rPr>
-              <a:t> 2.0</a:t>
-            </a:r>
-            <a:endParaRPr lang="hr-HR" dirty="0">
-              <a:cs typeface="Aldhabi" panose="01000000000000000000" pitchFamily="2" charset="-78"/>
-            </a:endParaRPr>
-          </a:p>
-          <a:p>
-            <a:pPr lvl="2"/>
-            <a:r>
-              <a:rPr lang="hr-HR" dirty="0">
-                <a:cs typeface="Aldhabi" panose="01000000000000000000" pitchFamily="2" charset="-78"/>
-                <a:hlinkClick r:id="rId3"/>
-              </a:rPr>
-              <a:t>BSD 3-Clause "New" </a:t>
-            </a:r>
-            <a:r>
-              <a:rPr lang="hr-HR" dirty="0" err="1">
-                <a:cs typeface="Aldhabi" panose="01000000000000000000" pitchFamily="2" charset="-78"/>
-                <a:hlinkClick r:id="rId3"/>
-              </a:rPr>
-              <a:t>or</a:t>
-            </a:r>
-            <a:r>
-              <a:rPr lang="hr-HR" dirty="0">
-                <a:cs typeface="Aldhabi" panose="01000000000000000000" pitchFamily="2" charset="-78"/>
-                <a:hlinkClick r:id="rId3"/>
-              </a:rPr>
-              <a:t> "</a:t>
-            </a:r>
-            <a:r>
-              <a:rPr lang="hr-HR" dirty="0" err="1">
-                <a:cs typeface="Aldhabi" panose="01000000000000000000" pitchFamily="2" charset="-78"/>
-                <a:hlinkClick r:id="rId3"/>
-              </a:rPr>
-              <a:t>Revised</a:t>
-            </a:r>
-            <a:r>
-              <a:rPr lang="hr-HR" dirty="0">
-                <a:cs typeface="Aldhabi" panose="01000000000000000000" pitchFamily="2" charset="-78"/>
-                <a:hlinkClick r:id="rId3"/>
-              </a:rPr>
-              <a:t>" </a:t>
-            </a:r>
-            <a:r>
-              <a:rPr lang="hr-HR" dirty="0" err="1">
-                <a:cs typeface="Aldhabi" panose="01000000000000000000" pitchFamily="2" charset="-78"/>
-                <a:hlinkClick r:id="rId3"/>
-              </a:rPr>
-              <a:t>license</a:t>
-            </a:r>
-            <a:endParaRPr lang="hr-HR" dirty="0">
-              <a:cs typeface="Aldhabi" panose="01000000000000000000" pitchFamily="2" charset="-78"/>
-            </a:endParaRPr>
-          </a:p>
-          <a:p>
-            <a:pPr lvl="2"/>
-            <a:r>
-              <a:rPr lang="hr-HR" dirty="0">
-                <a:cs typeface="Aldhabi" panose="01000000000000000000" pitchFamily="2" charset="-78"/>
-                <a:hlinkClick r:id="rId4"/>
-              </a:rPr>
-              <a:t>BSD 2-Clause "</a:t>
-            </a:r>
-            <a:r>
-              <a:rPr lang="hr-HR" dirty="0" err="1">
-                <a:cs typeface="Aldhabi" panose="01000000000000000000" pitchFamily="2" charset="-78"/>
-                <a:hlinkClick r:id="rId4"/>
-              </a:rPr>
-              <a:t>Simplified</a:t>
-            </a:r>
-            <a:r>
-              <a:rPr lang="hr-HR" dirty="0">
-                <a:cs typeface="Aldhabi" panose="01000000000000000000" pitchFamily="2" charset="-78"/>
-                <a:hlinkClick r:id="rId4"/>
-              </a:rPr>
-              <a:t>" </a:t>
-            </a:r>
-            <a:r>
-              <a:rPr lang="hr-HR" dirty="0" err="1">
-                <a:cs typeface="Aldhabi" panose="01000000000000000000" pitchFamily="2" charset="-78"/>
-                <a:hlinkClick r:id="rId4"/>
-              </a:rPr>
-              <a:t>or</a:t>
-            </a:r>
-            <a:r>
-              <a:rPr lang="hr-HR" dirty="0">
-                <a:cs typeface="Aldhabi" panose="01000000000000000000" pitchFamily="2" charset="-78"/>
-                <a:hlinkClick r:id="rId4"/>
-              </a:rPr>
-              <a:t> "</a:t>
-            </a:r>
-            <a:r>
-              <a:rPr lang="hr-HR" dirty="0" err="1">
-                <a:cs typeface="Aldhabi" panose="01000000000000000000" pitchFamily="2" charset="-78"/>
-                <a:hlinkClick r:id="rId4"/>
-              </a:rPr>
-              <a:t>FreeBSD</a:t>
-            </a:r>
-            <a:r>
-              <a:rPr lang="hr-HR" dirty="0">
-                <a:cs typeface="Aldhabi" panose="01000000000000000000" pitchFamily="2" charset="-78"/>
-                <a:hlinkClick r:id="rId4"/>
-              </a:rPr>
-              <a:t>" </a:t>
-            </a:r>
-            <a:r>
-              <a:rPr lang="hr-HR" dirty="0" err="1">
-                <a:cs typeface="Aldhabi" panose="01000000000000000000" pitchFamily="2" charset="-78"/>
-                <a:hlinkClick r:id="rId4"/>
-              </a:rPr>
-              <a:t>license</a:t>
-            </a:r>
-            <a:endParaRPr lang="hr-HR" dirty="0">
-              <a:cs typeface="Aldhabi" panose="01000000000000000000" pitchFamily="2" charset="-78"/>
-            </a:endParaRPr>
-          </a:p>
-          <a:p>
-            <a:pPr lvl="2"/>
-            <a:r>
-              <a:rPr lang="hr-HR" dirty="0">
-                <a:cs typeface="Aldhabi" panose="01000000000000000000" pitchFamily="2" charset="-78"/>
-                <a:hlinkClick r:id="rId5"/>
-              </a:rPr>
-              <a:t>GNU General </a:t>
-            </a:r>
-            <a:r>
-              <a:rPr lang="hr-HR" dirty="0" err="1">
-                <a:cs typeface="Aldhabi" panose="01000000000000000000" pitchFamily="2" charset="-78"/>
-                <a:hlinkClick r:id="rId5"/>
-              </a:rPr>
-              <a:t>Public</a:t>
-            </a:r>
-            <a:r>
-              <a:rPr lang="hr-HR" dirty="0">
-                <a:cs typeface="Aldhabi" panose="01000000000000000000" pitchFamily="2" charset="-78"/>
-                <a:hlinkClick r:id="rId5"/>
-              </a:rPr>
-              <a:t> </a:t>
-            </a:r>
-            <a:r>
-              <a:rPr lang="hr-HR" dirty="0" err="1">
-                <a:cs typeface="Aldhabi" panose="01000000000000000000" pitchFamily="2" charset="-78"/>
-                <a:hlinkClick r:id="rId5"/>
-              </a:rPr>
-              <a:t>License</a:t>
-            </a:r>
-            <a:r>
-              <a:rPr lang="hr-HR" dirty="0">
-                <a:cs typeface="Aldhabi" panose="01000000000000000000" pitchFamily="2" charset="-78"/>
-                <a:hlinkClick r:id="rId5"/>
-              </a:rPr>
-              <a:t> (GPL)</a:t>
-            </a:r>
-            <a:endParaRPr lang="hr-HR" dirty="0">
-              <a:cs typeface="Aldhabi" panose="01000000000000000000" pitchFamily="2" charset="-78"/>
-            </a:endParaRPr>
-          </a:p>
-          <a:p>
-            <a:pPr lvl="2"/>
-            <a:r>
-              <a:rPr lang="hr-HR" dirty="0">
-                <a:cs typeface="Aldhabi" panose="01000000000000000000" pitchFamily="2" charset="-78"/>
-                <a:hlinkClick r:id="rId6"/>
-              </a:rPr>
-              <a:t>GNU </a:t>
-            </a:r>
-            <a:r>
-              <a:rPr lang="hr-HR" dirty="0" err="1">
-                <a:cs typeface="Aldhabi" panose="01000000000000000000" pitchFamily="2" charset="-78"/>
-                <a:hlinkClick r:id="rId6"/>
-              </a:rPr>
-              <a:t>Library</a:t>
-            </a:r>
-            <a:r>
-              <a:rPr lang="hr-HR" dirty="0">
-                <a:cs typeface="Aldhabi" panose="01000000000000000000" pitchFamily="2" charset="-78"/>
-                <a:hlinkClick r:id="rId6"/>
-              </a:rPr>
-              <a:t> </a:t>
-            </a:r>
-            <a:r>
-              <a:rPr lang="hr-HR" dirty="0" err="1">
-                <a:cs typeface="Aldhabi" panose="01000000000000000000" pitchFamily="2" charset="-78"/>
-                <a:hlinkClick r:id="rId6"/>
-              </a:rPr>
-              <a:t>or</a:t>
-            </a:r>
-            <a:r>
-              <a:rPr lang="hr-HR" dirty="0">
-                <a:cs typeface="Aldhabi" panose="01000000000000000000" pitchFamily="2" charset="-78"/>
-                <a:hlinkClick r:id="rId6"/>
-              </a:rPr>
-              <a:t> "</a:t>
-            </a:r>
-            <a:r>
-              <a:rPr lang="hr-HR" dirty="0" err="1">
-                <a:cs typeface="Aldhabi" panose="01000000000000000000" pitchFamily="2" charset="-78"/>
-                <a:hlinkClick r:id="rId6"/>
-              </a:rPr>
-              <a:t>Lesser</a:t>
-            </a:r>
-            <a:r>
-              <a:rPr lang="hr-HR" dirty="0">
-                <a:cs typeface="Aldhabi" panose="01000000000000000000" pitchFamily="2" charset="-78"/>
-                <a:hlinkClick r:id="rId6"/>
-              </a:rPr>
-              <a:t>" General </a:t>
-            </a:r>
-            <a:r>
-              <a:rPr lang="hr-HR" dirty="0" err="1">
-                <a:cs typeface="Aldhabi" panose="01000000000000000000" pitchFamily="2" charset="-78"/>
-                <a:hlinkClick r:id="rId6"/>
-              </a:rPr>
-              <a:t>Public</a:t>
-            </a:r>
-            <a:r>
-              <a:rPr lang="hr-HR" dirty="0">
-                <a:cs typeface="Aldhabi" panose="01000000000000000000" pitchFamily="2" charset="-78"/>
-                <a:hlinkClick r:id="rId6"/>
-              </a:rPr>
-              <a:t> </a:t>
-            </a:r>
-            <a:r>
-              <a:rPr lang="hr-HR" dirty="0" err="1">
-                <a:cs typeface="Aldhabi" panose="01000000000000000000" pitchFamily="2" charset="-78"/>
-                <a:hlinkClick r:id="rId6"/>
-              </a:rPr>
-              <a:t>License</a:t>
-            </a:r>
-            <a:r>
-              <a:rPr lang="hr-HR" dirty="0">
-                <a:cs typeface="Aldhabi" panose="01000000000000000000" pitchFamily="2" charset="-78"/>
-                <a:hlinkClick r:id="rId6"/>
-              </a:rPr>
-              <a:t> (LGPL)</a:t>
-            </a:r>
-            <a:endParaRPr lang="hr-HR" dirty="0">
-              <a:cs typeface="Aldhabi" panose="01000000000000000000" pitchFamily="2" charset="-78"/>
-            </a:endParaRPr>
-          </a:p>
-          <a:p>
-            <a:pPr lvl="2"/>
-            <a:r>
-              <a:rPr lang="hr-HR" dirty="0">
-                <a:cs typeface="Aldhabi" panose="01000000000000000000" pitchFamily="2" charset="-78"/>
-                <a:hlinkClick r:id="rId7"/>
-              </a:rPr>
-              <a:t>MIT </a:t>
-            </a:r>
-            <a:r>
-              <a:rPr lang="hr-HR" dirty="0" err="1">
-                <a:cs typeface="Aldhabi" panose="01000000000000000000" pitchFamily="2" charset="-78"/>
-                <a:hlinkClick r:id="rId7"/>
-              </a:rPr>
-              <a:t>license</a:t>
-            </a:r>
-            <a:endParaRPr lang="hr-HR" dirty="0">
-              <a:cs typeface="Aldhabi" panose="01000000000000000000" pitchFamily="2" charset="-78"/>
-            </a:endParaRPr>
-          </a:p>
-          <a:p>
-            <a:pPr lvl="2"/>
-            <a:r>
-              <a:rPr lang="hr-HR" dirty="0" err="1">
-                <a:cs typeface="Aldhabi" panose="01000000000000000000" pitchFamily="2" charset="-78"/>
-                <a:hlinkClick r:id="rId8"/>
-              </a:rPr>
-              <a:t>Mozilla</a:t>
-            </a:r>
-            <a:r>
-              <a:rPr lang="hr-HR" dirty="0">
-                <a:cs typeface="Aldhabi" panose="01000000000000000000" pitchFamily="2" charset="-78"/>
-                <a:hlinkClick r:id="rId8"/>
-              </a:rPr>
-              <a:t> </a:t>
-            </a:r>
-            <a:r>
-              <a:rPr lang="hr-HR" dirty="0" err="1">
-                <a:cs typeface="Aldhabi" panose="01000000000000000000" pitchFamily="2" charset="-78"/>
-                <a:hlinkClick r:id="rId8"/>
-              </a:rPr>
-              <a:t>Public</a:t>
-            </a:r>
-            <a:r>
-              <a:rPr lang="hr-HR" dirty="0">
-                <a:cs typeface="Aldhabi" panose="01000000000000000000" pitchFamily="2" charset="-78"/>
-                <a:hlinkClick r:id="rId8"/>
-              </a:rPr>
-              <a:t> </a:t>
-            </a:r>
-            <a:r>
-              <a:rPr lang="hr-HR" dirty="0" err="1">
-                <a:cs typeface="Aldhabi" panose="01000000000000000000" pitchFamily="2" charset="-78"/>
-                <a:hlinkClick r:id="rId8"/>
-              </a:rPr>
-              <a:t>License</a:t>
-            </a:r>
-            <a:r>
-              <a:rPr lang="hr-HR" dirty="0">
-                <a:cs typeface="Aldhabi" panose="01000000000000000000" pitchFamily="2" charset="-78"/>
-                <a:hlinkClick r:id="rId8"/>
-              </a:rPr>
-              <a:t> 2.0</a:t>
-            </a:r>
-            <a:endParaRPr lang="hr-HR" dirty="0">
-              <a:cs typeface="Aldhabi" panose="01000000000000000000" pitchFamily="2" charset="-78"/>
-            </a:endParaRPr>
-          </a:p>
-          <a:p>
-            <a:pPr lvl="2"/>
-            <a:r>
-              <a:rPr lang="hr-HR" dirty="0" err="1">
-                <a:cs typeface="Aldhabi" panose="01000000000000000000" pitchFamily="2" charset="-78"/>
-                <a:hlinkClick r:id="rId9"/>
-              </a:rPr>
-              <a:t>Common</a:t>
-            </a:r>
-            <a:r>
-              <a:rPr lang="hr-HR" dirty="0">
-                <a:cs typeface="Aldhabi" panose="01000000000000000000" pitchFamily="2" charset="-78"/>
-                <a:hlinkClick r:id="rId9"/>
-              </a:rPr>
-              <a:t> Development </a:t>
-            </a:r>
-            <a:r>
-              <a:rPr lang="hr-HR" dirty="0" err="1">
-                <a:cs typeface="Aldhabi" panose="01000000000000000000" pitchFamily="2" charset="-78"/>
-                <a:hlinkClick r:id="rId9"/>
-              </a:rPr>
-              <a:t>and</a:t>
-            </a:r>
-            <a:r>
-              <a:rPr lang="hr-HR" dirty="0">
-                <a:cs typeface="Aldhabi" panose="01000000000000000000" pitchFamily="2" charset="-78"/>
-                <a:hlinkClick r:id="rId9"/>
-              </a:rPr>
-              <a:t> </a:t>
-            </a:r>
-            <a:r>
-              <a:rPr lang="hr-HR" dirty="0" err="1">
-                <a:cs typeface="Aldhabi" panose="01000000000000000000" pitchFamily="2" charset="-78"/>
-                <a:hlinkClick r:id="rId9"/>
-              </a:rPr>
-              <a:t>Distribution</a:t>
-            </a:r>
-            <a:r>
-              <a:rPr lang="hr-HR" dirty="0">
-                <a:cs typeface="Aldhabi" panose="01000000000000000000" pitchFamily="2" charset="-78"/>
-                <a:hlinkClick r:id="rId9"/>
-              </a:rPr>
-              <a:t> </a:t>
-            </a:r>
-            <a:r>
-              <a:rPr lang="hr-HR" dirty="0" err="1">
-                <a:cs typeface="Aldhabi" panose="01000000000000000000" pitchFamily="2" charset="-78"/>
-                <a:hlinkClick r:id="rId9"/>
-              </a:rPr>
-              <a:t>License</a:t>
-            </a:r>
-            <a:endParaRPr lang="hr-HR" dirty="0">
-              <a:cs typeface="Aldhabi" panose="01000000000000000000" pitchFamily="2" charset="-78"/>
-            </a:endParaRPr>
-          </a:p>
-          <a:p>
-            <a:pPr lvl="2"/>
-            <a:r>
-              <a:rPr lang="hr-HR" dirty="0" err="1">
-                <a:cs typeface="Aldhabi" panose="01000000000000000000" pitchFamily="2" charset="-78"/>
-                <a:hlinkClick r:id="rId10"/>
-              </a:rPr>
-              <a:t>Eclipse</a:t>
-            </a:r>
-            <a:r>
-              <a:rPr lang="hr-HR" dirty="0">
-                <a:cs typeface="Aldhabi" panose="01000000000000000000" pitchFamily="2" charset="-78"/>
-                <a:hlinkClick r:id="rId10"/>
-              </a:rPr>
-              <a:t> </a:t>
-            </a:r>
-            <a:r>
-              <a:rPr lang="hr-HR" dirty="0" err="1">
-                <a:cs typeface="Aldhabi" panose="01000000000000000000" pitchFamily="2" charset="-78"/>
-                <a:hlinkClick r:id="rId10"/>
-              </a:rPr>
-              <a:t>Public</a:t>
-            </a:r>
-            <a:r>
-              <a:rPr lang="hr-HR" dirty="0">
-                <a:cs typeface="Aldhabi" panose="01000000000000000000" pitchFamily="2" charset="-78"/>
-                <a:hlinkClick r:id="rId10"/>
-              </a:rPr>
-              <a:t> </a:t>
-            </a:r>
-            <a:r>
-              <a:rPr lang="hr-HR" dirty="0" err="1">
-                <a:cs typeface="Aldhabi" panose="01000000000000000000" pitchFamily="2" charset="-78"/>
-                <a:hlinkClick r:id="rId10"/>
-              </a:rPr>
-              <a:t>License</a:t>
-            </a:r>
-            <a:endParaRPr lang="hr-HR" dirty="0">
-              <a:cs typeface="Aldhabi" panose="01000000000000000000" pitchFamily="2" charset="-78"/>
-            </a:endParaRPr>
-          </a:p>
-          <a:p>
-            <a:pPr lvl="2"/>
-            <a:endParaRPr lang="hr-HR" dirty="0"/>
-          </a:p>
-        </p:txBody>
-      </p:sp>
-    </p:spTree>
-    <p:extLst>
-      <p:ext uri="{BB962C8B-B14F-4D97-AF65-F5344CB8AC3E}">
-        <p14:creationId xmlns:p14="http://schemas.microsoft.com/office/powerpoint/2010/main" val="2865199503"/>
-      </p:ext>
-    </p:extLst>
-  </p:cSld>
-  <p:clrMapOvr>
-    <a:masterClrMapping/>
-  </p:clrMapOvr>
-</p:sld>
-</file>
-
 <file path=ppt/slides/slide4.xml><?xml version="1.0" encoding="utf-8"?>
 <p:sld xmlns:a="http://schemas.openxmlformats.org/drawingml/2006/main" xmlns:r="http://schemas.openxmlformats.org/officeDocument/2006/relationships" xmlns:p="http://schemas.openxmlformats.org/presentationml/2006/main">
   <p:cSld>
@@ -8682,6 +8367,549 @@
         <p:spPr/>
         <p:txBody>
           <a:bodyPr>
+            <a:normAutofit lnSpcReduction="10000"/>
+          </a:bodyPr>
+          <a:lstStyle/>
+          <a:p>
+            <a:r>
+              <a:rPr lang="hr-HR" dirty="0" smtClean="0"/>
+              <a:t>Potpuno slobodan za pojedince</a:t>
+            </a:r>
+          </a:p>
+          <a:p>
+            <a:r>
+              <a:rPr lang="hr-HR" dirty="0" smtClean="0"/>
+              <a:t>Za organizacije:</a:t>
+            </a:r>
+          </a:p>
+          <a:p>
+            <a:pPr lvl="1"/>
+            <a:r>
+              <a:rPr lang="hr-HR" dirty="0" smtClean="0"/>
+              <a:t>Slobodan za razvoj aplikacija pod OSI </a:t>
+            </a:r>
+            <a:r>
+              <a:rPr lang="hr-HR" dirty="0" err="1" smtClean="0"/>
+              <a:t>open</a:t>
+            </a:r>
+            <a:r>
+              <a:rPr lang="hr-HR" dirty="0" smtClean="0"/>
+              <a:t> </a:t>
+            </a:r>
+            <a:r>
+              <a:rPr lang="hr-HR" dirty="0" err="1" smtClean="0"/>
+              <a:t>source</a:t>
+            </a:r>
+            <a:r>
+              <a:rPr lang="hr-HR" dirty="0" smtClean="0"/>
+              <a:t> licencama:</a:t>
+            </a:r>
+          </a:p>
+          <a:p>
+            <a:pPr lvl="2"/>
+            <a:r>
+              <a:rPr lang="hr-HR" dirty="0">
+                <a:cs typeface="Aldhabi" panose="01000000000000000000" pitchFamily="2" charset="-78"/>
+                <a:hlinkClick r:id="rId2"/>
+              </a:rPr>
+              <a:t>Apache </a:t>
+            </a:r>
+            <a:r>
+              <a:rPr lang="hr-HR" dirty="0" err="1">
+                <a:cs typeface="Aldhabi" panose="01000000000000000000" pitchFamily="2" charset="-78"/>
+                <a:hlinkClick r:id="rId2"/>
+              </a:rPr>
+              <a:t>License</a:t>
+            </a:r>
+            <a:r>
+              <a:rPr lang="hr-HR" dirty="0">
+                <a:cs typeface="Aldhabi" panose="01000000000000000000" pitchFamily="2" charset="-78"/>
+                <a:hlinkClick r:id="rId2"/>
+              </a:rPr>
+              <a:t> 2.0</a:t>
+            </a:r>
+            <a:endParaRPr lang="hr-HR" dirty="0">
+              <a:cs typeface="Aldhabi" panose="01000000000000000000" pitchFamily="2" charset="-78"/>
+            </a:endParaRPr>
+          </a:p>
+          <a:p>
+            <a:pPr lvl="2"/>
+            <a:r>
+              <a:rPr lang="hr-HR" dirty="0">
+                <a:cs typeface="Aldhabi" panose="01000000000000000000" pitchFamily="2" charset="-78"/>
+                <a:hlinkClick r:id="rId3"/>
+              </a:rPr>
+              <a:t>BSD 3-Clause "New" </a:t>
+            </a:r>
+            <a:r>
+              <a:rPr lang="hr-HR" dirty="0" err="1">
+                <a:cs typeface="Aldhabi" panose="01000000000000000000" pitchFamily="2" charset="-78"/>
+                <a:hlinkClick r:id="rId3"/>
+              </a:rPr>
+              <a:t>or</a:t>
+            </a:r>
+            <a:r>
+              <a:rPr lang="hr-HR" dirty="0">
+                <a:cs typeface="Aldhabi" panose="01000000000000000000" pitchFamily="2" charset="-78"/>
+                <a:hlinkClick r:id="rId3"/>
+              </a:rPr>
+              <a:t> "</a:t>
+            </a:r>
+            <a:r>
+              <a:rPr lang="hr-HR" dirty="0" err="1">
+                <a:cs typeface="Aldhabi" panose="01000000000000000000" pitchFamily="2" charset="-78"/>
+                <a:hlinkClick r:id="rId3"/>
+              </a:rPr>
+              <a:t>Revised</a:t>
+            </a:r>
+            <a:r>
+              <a:rPr lang="hr-HR" dirty="0">
+                <a:cs typeface="Aldhabi" panose="01000000000000000000" pitchFamily="2" charset="-78"/>
+                <a:hlinkClick r:id="rId3"/>
+              </a:rPr>
+              <a:t>" </a:t>
+            </a:r>
+            <a:r>
+              <a:rPr lang="hr-HR" dirty="0" err="1">
+                <a:cs typeface="Aldhabi" panose="01000000000000000000" pitchFamily="2" charset="-78"/>
+                <a:hlinkClick r:id="rId3"/>
+              </a:rPr>
+              <a:t>license</a:t>
+            </a:r>
+            <a:endParaRPr lang="hr-HR" dirty="0">
+              <a:cs typeface="Aldhabi" panose="01000000000000000000" pitchFamily="2" charset="-78"/>
+            </a:endParaRPr>
+          </a:p>
+          <a:p>
+            <a:pPr lvl="2"/>
+            <a:r>
+              <a:rPr lang="hr-HR" dirty="0">
+                <a:cs typeface="Aldhabi" panose="01000000000000000000" pitchFamily="2" charset="-78"/>
+                <a:hlinkClick r:id="rId4"/>
+              </a:rPr>
+              <a:t>BSD 2-Clause "</a:t>
+            </a:r>
+            <a:r>
+              <a:rPr lang="hr-HR" dirty="0" err="1">
+                <a:cs typeface="Aldhabi" panose="01000000000000000000" pitchFamily="2" charset="-78"/>
+                <a:hlinkClick r:id="rId4"/>
+              </a:rPr>
+              <a:t>Simplified</a:t>
+            </a:r>
+            <a:r>
+              <a:rPr lang="hr-HR" dirty="0">
+                <a:cs typeface="Aldhabi" panose="01000000000000000000" pitchFamily="2" charset="-78"/>
+                <a:hlinkClick r:id="rId4"/>
+              </a:rPr>
+              <a:t>" </a:t>
+            </a:r>
+            <a:r>
+              <a:rPr lang="hr-HR" dirty="0" err="1">
+                <a:cs typeface="Aldhabi" panose="01000000000000000000" pitchFamily="2" charset="-78"/>
+                <a:hlinkClick r:id="rId4"/>
+              </a:rPr>
+              <a:t>or</a:t>
+            </a:r>
+            <a:r>
+              <a:rPr lang="hr-HR" dirty="0">
+                <a:cs typeface="Aldhabi" panose="01000000000000000000" pitchFamily="2" charset="-78"/>
+                <a:hlinkClick r:id="rId4"/>
+              </a:rPr>
+              <a:t> "</a:t>
+            </a:r>
+            <a:r>
+              <a:rPr lang="hr-HR" dirty="0" err="1">
+                <a:cs typeface="Aldhabi" panose="01000000000000000000" pitchFamily="2" charset="-78"/>
+                <a:hlinkClick r:id="rId4"/>
+              </a:rPr>
+              <a:t>FreeBSD</a:t>
+            </a:r>
+            <a:r>
+              <a:rPr lang="hr-HR" dirty="0">
+                <a:cs typeface="Aldhabi" panose="01000000000000000000" pitchFamily="2" charset="-78"/>
+                <a:hlinkClick r:id="rId4"/>
+              </a:rPr>
+              <a:t>" </a:t>
+            </a:r>
+            <a:r>
+              <a:rPr lang="hr-HR" dirty="0" err="1">
+                <a:cs typeface="Aldhabi" panose="01000000000000000000" pitchFamily="2" charset="-78"/>
+                <a:hlinkClick r:id="rId4"/>
+              </a:rPr>
+              <a:t>license</a:t>
+            </a:r>
+            <a:endParaRPr lang="hr-HR" dirty="0">
+              <a:cs typeface="Aldhabi" panose="01000000000000000000" pitchFamily="2" charset="-78"/>
+            </a:endParaRPr>
+          </a:p>
+          <a:p>
+            <a:pPr lvl="2"/>
+            <a:r>
+              <a:rPr lang="hr-HR" dirty="0">
+                <a:cs typeface="Aldhabi" panose="01000000000000000000" pitchFamily="2" charset="-78"/>
+                <a:hlinkClick r:id="rId5"/>
+              </a:rPr>
+              <a:t>GNU General </a:t>
+            </a:r>
+            <a:r>
+              <a:rPr lang="hr-HR" dirty="0" err="1">
+                <a:cs typeface="Aldhabi" panose="01000000000000000000" pitchFamily="2" charset="-78"/>
+                <a:hlinkClick r:id="rId5"/>
+              </a:rPr>
+              <a:t>Public</a:t>
+            </a:r>
+            <a:r>
+              <a:rPr lang="hr-HR" dirty="0">
+                <a:cs typeface="Aldhabi" panose="01000000000000000000" pitchFamily="2" charset="-78"/>
+                <a:hlinkClick r:id="rId5"/>
+              </a:rPr>
+              <a:t> </a:t>
+            </a:r>
+            <a:r>
+              <a:rPr lang="hr-HR" dirty="0" err="1">
+                <a:cs typeface="Aldhabi" panose="01000000000000000000" pitchFamily="2" charset="-78"/>
+                <a:hlinkClick r:id="rId5"/>
+              </a:rPr>
+              <a:t>License</a:t>
+            </a:r>
+            <a:r>
+              <a:rPr lang="hr-HR" dirty="0">
+                <a:cs typeface="Aldhabi" panose="01000000000000000000" pitchFamily="2" charset="-78"/>
+                <a:hlinkClick r:id="rId5"/>
+              </a:rPr>
+              <a:t> (GPL)</a:t>
+            </a:r>
+            <a:endParaRPr lang="hr-HR" dirty="0">
+              <a:cs typeface="Aldhabi" panose="01000000000000000000" pitchFamily="2" charset="-78"/>
+            </a:endParaRPr>
+          </a:p>
+          <a:p>
+            <a:pPr lvl="2"/>
+            <a:r>
+              <a:rPr lang="hr-HR" dirty="0">
+                <a:cs typeface="Aldhabi" panose="01000000000000000000" pitchFamily="2" charset="-78"/>
+                <a:hlinkClick r:id="rId6"/>
+              </a:rPr>
+              <a:t>GNU </a:t>
+            </a:r>
+            <a:r>
+              <a:rPr lang="hr-HR" dirty="0" err="1">
+                <a:cs typeface="Aldhabi" panose="01000000000000000000" pitchFamily="2" charset="-78"/>
+                <a:hlinkClick r:id="rId6"/>
+              </a:rPr>
+              <a:t>Library</a:t>
+            </a:r>
+            <a:r>
+              <a:rPr lang="hr-HR" dirty="0">
+                <a:cs typeface="Aldhabi" panose="01000000000000000000" pitchFamily="2" charset="-78"/>
+                <a:hlinkClick r:id="rId6"/>
+              </a:rPr>
+              <a:t> </a:t>
+            </a:r>
+            <a:r>
+              <a:rPr lang="hr-HR" dirty="0" err="1">
+                <a:cs typeface="Aldhabi" panose="01000000000000000000" pitchFamily="2" charset="-78"/>
+                <a:hlinkClick r:id="rId6"/>
+              </a:rPr>
+              <a:t>or</a:t>
+            </a:r>
+            <a:r>
+              <a:rPr lang="hr-HR" dirty="0">
+                <a:cs typeface="Aldhabi" panose="01000000000000000000" pitchFamily="2" charset="-78"/>
+                <a:hlinkClick r:id="rId6"/>
+              </a:rPr>
+              <a:t> "</a:t>
+            </a:r>
+            <a:r>
+              <a:rPr lang="hr-HR" dirty="0" err="1">
+                <a:cs typeface="Aldhabi" panose="01000000000000000000" pitchFamily="2" charset="-78"/>
+                <a:hlinkClick r:id="rId6"/>
+              </a:rPr>
+              <a:t>Lesser</a:t>
+            </a:r>
+            <a:r>
+              <a:rPr lang="hr-HR" dirty="0">
+                <a:cs typeface="Aldhabi" panose="01000000000000000000" pitchFamily="2" charset="-78"/>
+                <a:hlinkClick r:id="rId6"/>
+              </a:rPr>
+              <a:t>" General </a:t>
+            </a:r>
+            <a:r>
+              <a:rPr lang="hr-HR" dirty="0" err="1">
+                <a:cs typeface="Aldhabi" panose="01000000000000000000" pitchFamily="2" charset="-78"/>
+                <a:hlinkClick r:id="rId6"/>
+              </a:rPr>
+              <a:t>Public</a:t>
+            </a:r>
+            <a:r>
+              <a:rPr lang="hr-HR" dirty="0">
+                <a:cs typeface="Aldhabi" panose="01000000000000000000" pitchFamily="2" charset="-78"/>
+                <a:hlinkClick r:id="rId6"/>
+              </a:rPr>
+              <a:t> </a:t>
+            </a:r>
+            <a:r>
+              <a:rPr lang="hr-HR" dirty="0" err="1">
+                <a:cs typeface="Aldhabi" panose="01000000000000000000" pitchFamily="2" charset="-78"/>
+                <a:hlinkClick r:id="rId6"/>
+              </a:rPr>
+              <a:t>License</a:t>
+            </a:r>
+            <a:r>
+              <a:rPr lang="hr-HR" dirty="0">
+                <a:cs typeface="Aldhabi" panose="01000000000000000000" pitchFamily="2" charset="-78"/>
+                <a:hlinkClick r:id="rId6"/>
+              </a:rPr>
+              <a:t> (LGPL)</a:t>
+            </a:r>
+            <a:endParaRPr lang="hr-HR" dirty="0">
+              <a:cs typeface="Aldhabi" panose="01000000000000000000" pitchFamily="2" charset="-78"/>
+            </a:endParaRPr>
+          </a:p>
+          <a:p>
+            <a:pPr lvl="2"/>
+            <a:r>
+              <a:rPr lang="hr-HR" dirty="0">
+                <a:cs typeface="Aldhabi" panose="01000000000000000000" pitchFamily="2" charset="-78"/>
+                <a:hlinkClick r:id="rId7"/>
+              </a:rPr>
+              <a:t>MIT </a:t>
+            </a:r>
+            <a:r>
+              <a:rPr lang="hr-HR" dirty="0" err="1">
+                <a:cs typeface="Aldhabi" panose="01000000000000000000" pitchFamily="2" charset="-78"/>
+                <a:hlinkClick r:id="rId7"/>
+              </a:rPr>
+              <a:t>license</a:t>
+            </a:r>
+            <a:endParaRPr lang="hr-HR" dirty="0">
+              <a:cs typeface="Aldhabi" panose="01000000000000000000" pitchFamily="2" charset="-78"/>
+            </a:endParaRPr>
+          </a:p>
+          <a:p>
+            <a:pPr lvl="2"/>
+            <a:r>
+              <a:rPr lang="hr-HR" dirty="0" err="1">
+                <a:cs typeface="Aldhabi" panose="01000000000000000000" pitchFamily="2" charset="-78"/>
+                <a:hlinkClick r:id="rId8"/>
+              </a:rPr>
+              <a:t>Mozilla</a:t>
+            </a:r>
+            <a:r>
+              <a:rPr lang="hr-HR" dirty="0">
+                <a:cs typeface="Aldhabi" panose="01000000000000000000" pitchFamily="2" charset="-78"/>
+                <a:hlinkClick r:id="rId8"/>
+              </a:rPr>
+              <a:t> </a:t>
+            </a:r>
+            <a:r>
+              <a:rPr lang="hr-HR" dirty="0" err="1">
+                <a:cs typeface="Aldhabi" panose="01000000000000000000" pitchFamily="2" charset="-78"/>
+                <a:hlinkClick r:id="rId8"/>
+              </a:rPr>
+              <a:t>Public</a:t>
+            </a:r>
+            <a:r>
+              <a:rPr lang="hr-HR" dirty="0">
+                <a:cs typeface="Aldhabi" panose="01000000000000000000" pitchFamily="2" charset="-78"/>
+                <a:hlinkClick r:id="rId8"/>
+              </a:rPr>
+              <a:t> </a:t>
+            </a:r>
+            <a:r>
+              <a:rPr lang="hr-HR" dirty="0" err="1">
+                <a:cs typeface="Aldhabi" panose="01000000000000000000" pitchFamily="2" charset="-78"/>
+                <a:hlinkClick r:id="rId8"/>
+              </a:rPr>
+              <a:t>License</a:t>
+            </a:r>
+            <a:r>
+              <a:rPr lang="hr-HR" dirty="0">
+                <a:cs typeface="Aldhabi" panose="01000000000000000000" pitchFamily="2" charset="-78"/>
+                <a:hlinkClick r:id="rId8"/>
+              </a:rPr>
+              <a:t> 2.0</a:t>
+            </a:r>
+            <a:endParaRPr lang="hr-HR" dirty="0">
+              <a:cs typeface="Aldhabi" panose="01000000000000000000" pitchFamily="2" charset="-78"/>
+            </a:endParaRPr>
+          </a:p>
+          <a:p>
+            <a:pPr lvl="2"/>
+            <a:r>
+              <a:rPr lang="hr-HR" dirty="0" err="1">
+                <a:cs typeface="Aldhabi" panose="01000000000000000000" pitchFamily="2" charset="-78"/>
+                <a:hlinkClick r:id="rId9"/>
+              </a:rPr>
+              <a:t>Common</a:t>
+            </a:r>
+            <a:r>
+              <a:rPr lang="hr-HR" dirty="0">
+                <a:cs typeface="Aldhabi" panose="01000000000000000000" pitchFamily="2" charset="-78"/>
+                <a:hlinkClick r:id="rId9"/>
+              </a:rPr>
+              <a:t> Development </a:t>
+            </a:r>
+            <a:r>
+              <a:rPr lang="hr-HR" dirty="0" err="1">
+                <a:cs typeface="Aldhabi" panose="01000000000000000000" pitchFamily="2" charset="-78"/>
+                <a:hlinkClick r:id="rId9"/>
+              </a:rPr>
+              <a:t>and</a:t>
+            </a:r>
+            <a:r>
+              <a:rPr lang="hr-HR" dirty="0">
+                <a:cs typeface="Aldhabi" panose="01000000000000000000" pitchFamily="2" charset="-78"/>
+                <a:hlinkClick r:id="rId9"/>
+              </a:rPr>
+              <a:t> </a:t>
+            </a:r>
+            <a:r>
+              <a:rPr lang="hr-HR" dirty="0" err="1">
+                <a:cs typeface="Aldhabi" panose="01000000000000000000" pitchFamily="2" charset="-78"/>
+                <a:hlinkClick r:id="rId9"/>
+              </a:rPr>
+              <a:t>Distribution</a:t>
+            </a:r>
+            <a:r>
+              <a:rPr lang="hr-HR" dirty="0">
+                <a:cs typeface="Aldhabi" panose="01000000000000000000" pitchFamily="2" charset="-78"/>
+                <a:hlinkClick r:id="rId9"/>
+              </a:rPr>
+              <a:t> </a:t>
+            </a:r>
+            <a:r>
+              <a:rPr lang="hr-HR" dirty="0" err="1">
+                <a:cs typeface="Aldhabi" panose="01000000000000000000" pitchFamily="2" charset="-78"/>
+                <a:hlinkClick r:id="rId9"/>
+              </a:rPr>
+              <a:t>License</a:t>
+            </a:r>
+            <a:endParaRPr lang="hr-HR" dirty="0">
+              <a:cs typeface="Aldhabi" panose="01000000000000000000" pitchFamily="2" charset="-78"/>
+            </a:endParaRPr>
+          </a:p>
+          <a:p>
+            <a:pPr lvl="2"/>
+            <a:r>
+              <a:rPr lang="hr-HR" dirty="0" err="1">
+                <a:cs typeface="Aldhabi" panose="01000000000000000000" pitchFamily="2" charset="-78"/>
+                <a:hlinkClick r:id="rId10"/>
+              </a:rPr>
+              <a:t>Eclipse</a:t>
+            </a:r>
+            <a:r>
+              <a:rPr lang="hr-HR" dirty="0">
+                <a:cs typeface="Aldhabi" panose="01000000000000000000" pitchFamily="2" charset="-78"/>
+                <a:hlinkClick r:id="rId10"/>
+              </a:rPr>
+              <a:t> </a:t>
+            </a:r>
+            <a:r>
+              <a:rPr lang="hr-HR" dirty="0" err="1">
+                <a:cs typeface="Aldhabi" panose="01000000000000000000" pitchFamily="2" charset="-78"/>
+                <a:hlinkClick r:id="rId10"/>
+              </a:rPr>
+              <a:t>Public</a:t>
+            </a:r>
+            <a:r>
+              <a:rPr lang="hr-HR" dirty="0">
+                <a:cs typeface="Aldhabi" panose="01000000000000000000" pitchFamily="2" charset="-78"/>
+                <a:hlinkClick r:id="rId10"/>
+              </a:rPr>
+              <a:t> </a:t>
+            </a:r>
+            <a:r>
+              <a:rPr lang="hr-HR" dirty="0" err="1">
+                <a:cs typeface="Aldhabi" panose="01000000000000000000" pitchFamily="2" charset="-78"/>
+                <a:hlinkClick r:id="rId10"/>
+              </a:rPr>
+              <a:t>License</a:t>
+            </a:r>
+            <a:endParaRPr lang="hr-HR" dirty="0">
+              <a:cs typeface="Aldhabi" panose="01000000000000000000" pitchFamily="2" charset="-78"/>
+            </a:endParaRPr>
+          </a:p>
+          <a:p>
+            <a:pPr lvl="2"/>
+            <a:endParaRPr lang="hr-HR" dirty="0"/>
+          </a:p>
+        </p:txBody>
+      </p:sp>
+    </p:spTree>
+    <p:extLst>
+      <p:ext uri="{BB962C8B-B14F-4D97-AF65-F5344CB8AC3E}">
+        <p14:creationId xmlns:p14="http://schemas.microsoft.com/office/powerpoint/2010/main" val="2865199503"/>
+      </p:ext>
+    </p:extLst>
+  </p:cSld>
+  <p:clrMapOvr>
+    <a:masterClrMapping/>
+  </p:clrMapOvr>
+</p:sld>
+</file>
+
+<file path=ppt/slides/slide5.xml><?xml version="1.0" encoding="utf-8"?>
+<p:sld xmlns:a="http://schemas.openxmlformats.org/drawingml/2006/main" xmlns:r="http://schemas.openxmlformats.org/officeDocument/2006/relationships" xmlns:p="http://schemas.openxmlformats.org/presentationml/2006/main">
+  <p:cSld>
+    <p:spTree>
+      <p:nvGrpSpPr>
+        <p:cNvPr id="1" name=""/>
+        <p:cNvGrpSpPr/>
+        <p:nvPr/>
+      </p:nvGrpSpPr>
+      <p:grpSpPr>
+        <a:xfrm>
+          <a:off x="0" y="0"/>
+          <a:ext cx="0" cy="0"/>
+          <a:chOff x="0" y="0"/>
+          <a:chExt cx="0" cy="0"/>
+        </a:xfrm>
+      </p:grpSpPr>
+      <p:sp>
+        <p:nvSpPr>
+          <p:cNvPr id="2" name="Title 1"/>
+          <p:cNvSpPr>
+            <a:spLocks noGrp="1"/>
+          </p:cNvSpPr>
+          <p:nvPr>
+            <p:ph type="title"/>
+          </p:nvPr>
+        </p:nvSpPr>
+        <p:spPr/>
+        <p:txBody>
+          <a:bodyPr/>
+          <a:lstStyle/>
+          <a:p>
+            <a:r>
+              <a:rPr lang="hr-HR" dirty="0" err="1" smtClean="0"/>
+              <a:t>Visual</a:t>
+            </a:r>
+            <a:r>
+              <a:rPr lang="hr-HR" dirty="0" smtClean="0"/>
+              <a:t> Studio 2017 </a:t>
+            </a:r>
+            <a:r>
+              <a:rPr lang="hr-HR" dirty="0" err="1" smtClean="0"/>
+              <a:t>Community</a:t>
+            </a:r>
+            <a:endParaRPr lang="hr-HR" dirty="0"/>
+          </a:p>
+        </p:txBody>
+      </p:sp>
+      <p:sp>
+        <p:nvSpPr>
+          <p:cNvPr id="3" name="Content Placeholder 2"/>
+          <p:cNvSpPr>
+            <a:spLocks noGrp="1"/>
+          </p:cNvSpPr>
+          <p:nvPr>
+            <p:ph idx="1"/>
+          </p:nvPr>
+        </p:nvSpPr>
+        <p:spPr/>
+        <p:txBody>
+          <a:bodyPr>
             <a:normAutofit/>
           </a:bodyPr>
           <a:lstStyle/>
@@ -8754,7 +8982,7 @@
 </p:sld>
 </file>
 
-<file path=ppt/slides/slide5.xml><?xml version="1.0" encoding="utf-8"?>
+<file path=ppt/slides/slide6.xml><?xml version="1.0" encoding="utf-8"?>
 <p:sld xmlns:a="http://schemas.openxmlformats.org/drawingml/2006/main" xmlns:r="http://schemas.openxmlformats.org/officeDocument/2006/relationships" xmlns:p="http://schemas.openxmlformats.org/presentationml/2006/main">
   <p:cSld>
     <p:spTree>
@@ -8853,7 +9081,7 @@
 </p:sld>
 </file>
 
-<file path=ppt/slides/slide6.xml><?xml version="1.0" encoding="utf-8"?>
+<file path=ppt/slides/slide7.xml><?xml version="1.0" encoding="utf-8"?>
 <p:sld xmlns:a="http://schemas.openxmlformats.org/drawingml/2006/main" xmlns:r="http://schemas.openxmlformats.org/officeDocument/2006/relationships" xmlns:p="http://schemas.openxmlformats.org/presentationml/2006/main">
   <p:cSld>
     <p:spTree>
@@ -9049,7 +9277,7 @@
 </p:sld>
 </file>
 
-<file path=ppt/slides/slide7.xml><?xml version="1.0" encoding="utf-8"?>
+<file path=ppt/slides/slide8.xml><?xml version="1.0" encoding="utf-8"?>
 <p:sld xmlns:a="http://schemas.openxmlformats.org/drawingml/2006/main" xmlns:r="http://schemas.openxmlformats.org/officeDocument/2006/relationships" xmlns:p="http://schemas.openxmlformats.org/presentationml/2006/main">
   <p:cSld>
     <p:spTree>
@@ -9396,7 +9624,7 @@
 </p:sld>
 </file>
 
-<file path=ppt/slides/slide8.xml><?xml version="1.0" encoding="utf-8"?>
+<file path=ppt/slides/slide9.xml><?xml version="1.0" encoding="utf-8"?>
 <p:sld xmlns:a="http://schemas.openxmlformats.org/drawingml/2006/main" xmlns:r="http://schemas.openxmlformats.org/officeDocument/2006/relationships" xmlns:p="http://schemas.openxmlformats.org/presentationml/2006/main">
   <p:cSld>
     <p:spTree>
@@ -9549,104 +9777,6 @@
     <p:extLst>
       <p:ext uri="{BB962C8B-B14F-4D97-AF65-F5344CB8AC3E}">
         <p14:creationId xmlns:p14="http://schemas.microsoft.com/office/powerpoint/2010/main" val="2202298794"/>
-      </p:ext>
-    </p:extLst>
-  </p:cSld>
-  <p:clrMapOvr>
-    <a:masterClrMapping/>
-  </p:clrMapOvr>
-</p:sld>
-</file>
-
-<file path=ppt/slides/slide9.xml><?xml version="1.0" encoding="utf-8"?>
-<p:sld xmlns:a="http://schemas.openxmlformats.org/drawingml/2006/main" xmlns:r="http://schemas.openxmlformats.org/officeDocument/2006/relationships" xmlns:p="http://schemas.openxmlformats.org/presentationml/2006/main">
-  <p:cSld>
-    <p:spTree>
-      <p:nvGrpSpPr>
-        <p:cNvPr id="1" name=""/>
-        <p:cNvGrpSpPr/>
-        <p:nvPr/>
-      </p:nvGrpSpPr>
-      <p:grpSpPr>
-        <a:xfrm>
-          <a:off x="0" y="0"/>
-          <a:ext cx="0" cy="0"/>
-          <a:chOff x="0" y="0"/>
-          <a:chExt cx="0" cy="0"/>
-        </a:xfrm>
-      </p:grpSpPr>
-      <p:sp>
-        <p:nvSpPr>
-          <p:cNvPr id="2" name="Title 1"/>
-          <p:cNvSpPr>
-            <a:spLocks noGrp="1"/>
-          </p:cNvSpPr>
-          <p:nvPr>
-            <p:ph type="title"/>
-          </p:nvPr>
-        </p:nvSpPr>
-        <p:spPr/>
-        <p:txBody>
-          <a:bodyPr/>
-          <a:lstStyle/>
-          <a:p>
-            <a:endParaRPr lang="hr-HR"/>
-          </a:p>
-        </p:txBody>
-      </p:sp>
-      <p:sp>
-        <p:nvSpPr>
-          <p:cNvPr id="3" name="Content Placeholder 2"/>
-          <p:cNvSpPr>
-            <a:spLocks noGrp="1"/>
-          </p:cNvSpPr>
-          <p:nvPr>
-            <p:ph idx="1"/>
-          </p:nvPr>
-        </p:nvSpPr>
-        <p:spPr/>
-        <p:txBody>
-          <a:bodyPr/>
-          <a:lstStyle/>
-          <a:p>
-            <a:endParaRPr lang="hr-HR"/>
-          </a:p>
-        </p:txBody>
-      </p:sp>
-      <p:pic>
-        <p:nvPicPr>
-          <p:cNvPr id="4" name="Picture 3"/>
-          <p:cNvPicPr>
-            <a:picLocks noChangeAspect="1"/>
-          </p:cNvPicPr>
-          <p:nvPr/>
-        </p:nvPicPr>
-        <p:blipFill>
-          <a:blip r:embed="rId2">
-            <a:extLst>
-              <a:ext uri="{28A0092B-C50C-407E-A947-70E740481C1C}">
-                <a14:useLocalDpi xmlns:a14="http://schemas.microsoft.com/office/drawing/2010/main" val="0"/>
-              </a:ext>
-            </a:extLst>
-          </a:blip>
-          <a:stretch>
-            <a:fillRect/>
-          </a:stretch>
-        </p:blipFill>
-        <p:spPr>
-          <a:xfrm>
-            <a:off x="555913" y="450314"/>
-            <a:ext cx="11009169" cy="5726649"/>
-          </a:xfrm>
-          <a:prstGeom prst="rect">
-            <a:avLst/>
-          </a:prstGeom>
-        </p:spPr>
-      </p:pic>
-    </p:spTree>
-    <p:extLst>
-      <p:ext uri="{BB962C8B-B14F-4D97-AF65-F5344CB8AC3E}">
-        <p14:creationId xmlns:p14="http://schemas.microsoft.com/office/powerpoint/2010/main" val="257498850"/>
       </p:ext>
     </p:extLst>
   </p:cSld>

</xml_diff>